<commit_message>
Update Lecture1 - Introduction.pptx
</commit_message>
<xml_diff>
--- a/_umkc-teaching/slides/Lecture1 - Introduction.pptx
+++ b/_umkc-teaching/slides/Lecture1 - Introduction.pptx
@@ -5,7 +5,7 @@
     <p:sldMasterId id="2147483648" r:id="rId1"/>
   </p:sldMasterIdLst>
   <p:notesMasterIdLst>
-    <p:notesMasterId r:id="rId17"/>
+    <p:notesMasterId r:id="rId23"/>
   </p:notesMasterIdLst>
   <p:sldIdLst>
     <p:sldId id="257" r:id="rId2"/>
@@ -14,15 +14,21 @@
     <p:sldId id="258" r:id="rId5"/>
     <p:sldId id="283" r:id="rId6"/>
     <p:sldId id="263" r:id="rId7"/>
-    <p:sldId id="264" r:id="rId8"/>
-    <p:sldId id="265" r:id="rId9"/>
-    <p:sldId id="280" r:id="rId10"/>
-    <p:sldId id="285" r:id="rId11"/>
-    <p:sldId id="287" r:id="rId12"/>
-    <p:sldId id="286" r:id="rId13"/>
-    <p:sldId id="268" r:id="rId14"/>
-    <p:sldId id="278" r:id="rId15"/>
-    <p:sldId id="279" r:id="rId16"/>
+    <p:sldId id="292" r:id="rId8"/>
+    <p:sldId id="264" r:id="rId9"/>
+    <p:sldId id="265" r:id="rId10"/>
+    <p:sldId id="280" r:id="rId11"/>
+    <p:sldId id="285" r:id="rId12"/>
+    <p:sldId id="287" r:id="rId13"/>
+    <p:sldId id="286" r:id="rId14"/>
+    <p:sldId id="288" r:id="rId15"/>
+    <p:sldId id="289" r:id="rId16"/>
+    <p:sldId id="290" r:id="rId17"/>
+    <p:sldId id="291" r:id="rId18"/>
+    <p:sldId id="268" r:id="rId19"/>
+    <p:sldId id="278" r:id="rId20"/>
+    <p:sldId id="279" r:id="rId21"/>
+    <p:sldId id="293" r:id="rId22"/>
   </p:sldIdLst>
   <p:sldSz cx="12192000" cy="6858000"/>
   <p:notesSz cx="6858000" cy="9144000"/>
@@ -543,7 +549,7 @@
           <a:p>
             <a:fld id="{3F8BDF20-BE86-4883-8A23-4CE3D0058BEA}" type="slidenum">
               <a:rPr lang="en-US" smtClean="0"/>
-              <a:t>10</a:t>
+              <a:t>11</a:t>
             </a:fld>
             <a:endParaRPr lang="en-US"/>
           </a:p>
@@ -627,7 +633,7 @@
           <a:p>
             <a:fld id="{3F8BDF20-BE86-4883-8A23-4CE3D0058BEA}" type="slidenum">
               <a:rPr lang="en-US" smtClean="0"/>
-              <a:t>12</a:t>
+              <a:t>13</a:t>
             </a:fld>
             <a:endParaRPr lang="en-US"/>
           </a:p>
@@ -637,6 +643,342 @@
     <p:extLst>
       <p:ext uri="{BB962C8B-B14F-4D97-AF65-F5344CB8AC3E}">
         <p14:creationId xmlns:p14="http://schemas.microsoft.com/office/powerpoint/2010/main" val="27400421"/>
+      </p:ext>
+    </p:extLst>
+  </p:cSld>
+  <p:clrMapOvr>
+    <a:masterClrMapping/>
+  </p:clrMapOvr>
+</p:notes>
+</file>
+
+<file path=ppt/notesSlides/notesSlide3.xml><?xml version="1.0" encoding="utf-8"?>
+<p:notes xmlns:a="http://schemas.openxmlformats.org/drawingml/2006/main" xmlns:r="http://schemas.openxmlformats.org/officeDocument/2006/relationships" xmlns:p="http://schemas.openxmlformats.org/presentationml/2006/main">
+  <p:cSld>
+    <p:spTree>
+      <p:nvGrpSpPr>
+        <p:cNvPr id="1" name=""/>
+        <p:cNvGrpSpPr/>
+        <p:nvPr/>
+      </p:nvGrpSpPr>
+      <p:grpSpPr>
+        <a:xfrm>
+          <a:off x="0" y="0"/>
+          <a:ext cx="0" cy="0"/>
+          <a:chOff x="0" y="0"/>
+          <a:chExt cx="0" cy="0"/>
+        </a:xfrm>
+      </p:grpSpPr>
+      <p:sp>
+        <p:nvSpPr>
+          <p:cNvPr id="2" name="Slide Image Placeholder 1"/>
+          <p:cNvSpPr>
+            <a:spLocks noGrp="1" noRot="1" noChangeAspect="1"/>
+          </p:cNvSpPr>
+          <p:nvPr>
+            <p:ph type="sldImg"/>
+          </p:nvPr>
+        </p:nvSpPr>
+        <p:spPr/>
+      </p:sp>
+      <p:sp>
+        <p:nvSpPr>
+          <p:cNvPr id="3" name="Notes Placeholder 2"/>
+          <p:cNvSpPr>
+            <a:spLocks noGrp="1"/>
+          </p:cNvSpPr>
+          <p:nvPr>
+            <p:ph type="body" idx="1"/>
+          </p:nvPr>
+        </p:nvSpPr>
+        <p:spPr/>
+        <p:txBody>
+          <a:bodyPr/>
+          <a:lstStyle/>
+          <a:p>
+            <a:endParaRPr lang="en-US" dirty="0"/>
+          </a:p>
+        </p:txBody>
+      </p:sp>
+      <p:sp>
+        <p:nvSpPr>
+          <p:cNvPr id="4" name="Slide Number Placeholder 3"/>
+          <p:cNvSpPr>
+            <a:spLocks noGrp="1"/>
+          </p:cNvSpPr>
+          <p:nvPr>
+            <p:ph type="sldNum" sz="quarter" idx="5"/>
+          </p:nvPr>
+        </p:nvSpPr>
+        <p:spPr/>
+        <p:txBody>
+          <a:bodyPr/>
+          <a:lstStyle/>
+          <a:p>
+            <a:fld id="{3F8BDF20-BE86-4883-8A23-4CE3D0058BEA}" type="slidenum">
+              <a:rPr lang="en-US" smtClean="0"/>
+              <a:t>14</a:t>
+            </a:fld>
+            <a:endParaRPr lang="en-US"/>
+          </a:p>
+        </p:txBody>
+      </p:sp>
+    </p:spTree>
+    <p:extLst>
+      <p:ext uri="{BB962C8B-B14F-4D97-AF65-F5344CB8AC3E}">
+        <p14:creationId xmlns:p14="http://schemas.microsoft.com/office/powerpoint/2010/main" val="2863367235"/>
+      </p:ext>
+    </p:extLst>
+  </p:cSld>
+  <p:clrMapOvr>
+    <a:masterClrMapping/>
+  </p:clrMapOvr>
+</p:notes>
+</file>
+
+<file path=ppt/notesSlides/notesSlide4.xml><?xml version="1.0" encoding="utf-8"?>
+<p:notes xmlns:a="http://schemas.openxmlformats.org/drawingml/2006/main" xmlns:r="http://schemas.openxmlformats.org/officeDocument/2006/relationships" xmlns:p="http://schemas.openxmlformats.org/presentationml/2006/main">
+  <p:cSld>
+    <p:spTree>
+      <p:nvGrpSpPr>
+        <p:cNvPr id="1" name=""/>
+        <p:cNvGrpSpPr/>
+        <p:nvPr/>
+      </p:nvGrpSpPr>
+      <p:grpSpPr>
+        <a:xfrm>
+          <a:off x="0" y="0"/>
+          <a:ext cx="0" cy="0"/>
+          <a:chOff x="0" y="0"/>
+          <a:chExt cx="0" cy="0"/>
+        </a:xfrm>
+      </p:grpSpPr>
+      <p:sp>
+        <p:nvSpPr>
+          <p:cNvPr id="2" name="Slide Image Placeholder 1"/>
+          <p:cNvSpPr>
+            <a:spLocks noGrp="1" noRot="1" noChangeAspect="1"/>
+          </p:cNvSpPr>
+          <p:nvPr>
+            <p:ph type="sldImg"/>
+          </p:nvPr>
+        </p:nvSpPr>
+        <p:spPr/>
+      </p:sp>
+      <p:sp>
+        <p:nvSpPr>
+          <p:cNvPr id="3" name="Notes Placeholder 2"/>
+          <p:cNvSpPr>
+            <a:spLocks noGrp="1"/>
+          </p:cNvSpPr>
+          <p:nvPr>
+            <p:ph type="body" idx="1"/>
+          </p:nvPr>
+        </p:nvSpPr>
+        <p:spPr/>
+        <p:txBody>
+          <a:bodyPr/>
+          <a:lstStyle/>
+          <a:p>
+            <a:endParaRPr lang="en-US" dirty="0"/>
+          </a:p>
+        </p:txBody>
+      </p:sp>
+      <p:sp>
+        <p:nvSpPr>
+          <p:cNvPr id="4" name="Slide Number Placeholder 3"/>
+          <p:cNvSpPr>
+            <a:spLocks noGrp="1"/>
+          </p:cNvSpPr>
+          <p:nvPr>
+            <p:ph type="sldNum" sz="quarter" idx="5"/>
+          </p:nvPr>
+        </p:nvSpPr>
+        <p:spPr/>
+        <p:txBody>
+          <a:bodyPr/>
+          <a:lstStyle/>
+          <a:p>
+            <a:fld id="{3F8BDF20-BE86-4883-8A23-4CE3D0058BEA}" type="slidenum">
+              <a:rPr lang="en-US" smtClean="0"/>
+              <a:t>15</a:t>
+            </a:fld>
+            <a:endParaRPr lang="en-US"/>
+          </a:p>
+        </p:txBody>
+      </p:sp>
+    </p:spTree>
+    <p:extLst>
+      <p:ext uri="{BB962C8B-B14F-4D97-AF65-F5344CB8AC3E}">
+        <p14:creationId xmlns:p14="http://schemas.microsoft.com/office/powerpoint/2010/main" val="638870468"/>
+      </p:ext>
+    </p:extLst>
+  </p:cSld>
+  <p:clrMapOvr>
+    <a:masterClrMapping/>
+  </p:clrMapOvr>
+</p:notes>
+</file>
+
+<file path=ppt/notesSlides/notesSlide5.xml><?xml version="1.0" encoding="utf-8"?>
+<p:notes xmlns:a="http://schemas.openxmlformats.org/drawingml/2006/main" xmlns:r="http://schemas.openxmlformats.org/officeDocument/2006/relationships" xmlns:p="http://schemas.openxmlformats.org/presentationml/2006/main">
+  <p:cSld>
+    <p:spTree>
+      <p:nvGrpSpPr>
+        <p:cNvPr id="1" name=""/>
+        <p:cNvGrpSpPr/>
+        <p:nvPr/>
+      </p:nvGrpSpPr>
+      <p:grpSpPr>
+        <a:xfrm>
+          <a:off x="0" y="0"/>
+          <a:ext cx="0" cy="0"/>
+          <a:chOff x="0" y="0"/>
+          <a:chExt cx="0" cy="0"/>
+        </a:xfrm>
+      </p:grpSpPr>
+      <p:sp>
+        <p:nvSpPr>
+          <p:cNvPr id="2" name="Slide Image Placeholder 1"/>
+          <p:cNvSpPr>
+            <a:spLocks noGrp="1" noRot="1" noChangeAspect="1"/>
+          </p:cNvSpPr>
+          <p:nvPr>
+            <p:ph type="sldImg"/>
+          </p:nvPr>
+        </p:nvSpPr>
+        <p:spPr/>
+      </p:sp>
+      <p:sp>
+        <p:nvSpPr>
+          <p:cNvPr id="3" name="Notes Placeholder 2"/>
+          <p:cNvSpPr>
+            <a:spLocks noGrp="1"/>
+          </p:cNvSpPr>
+          <p:nvPr>
+            <p:ph type="body" idx="1"/>
+          </p:nvPr>
+        </p:nvSpPr>
+        <p:spPr/>
+        <p:txBody>
+          <a:bodyPr/>
+          <a:lstStyle/>
+          <a:p>
+            <a:endParaRPr lang="en-US" dirty="0"/>
+          </a:p>
+        </p:txBody>
+      </p:sp>
+      <p:sp>
+        <p:nvSpPr>
+          <p:cNvPr id="4" name="Slide Number Placeholder 3"/>
+          <p:cNvSpPr>
+            <a:spLocks noGrp="1"/>
+          </p:cNvSpPr>
+          <p:nvPr>
+            <p:ph type="sldNum" sz="quarter" idx="5"/>
+          </p:nvPr>
+        </p:nvSpPr>
+        <p:spPr/>
+        <p:txBody>
+          <a:bodyPr/>
+          <a:lstStyle/>
+          <a:p>
+            <a:fld id="{3F8BDF20-BE86-4883-8A23-4CE3D0058BEA}" type="slidenum">
+              <a:rPr lang="en-US" smtClean="0"/>
+              <a:t>16</a:t>
+            </a:fld>
+            <a:endParaRPr lang="en-US"/>
+          </a:p>
+        </p:txBody>
+      </p:sp>
+    </p:spTree>
+    <p:extLst>
+      <p:ext uri="{BB962C8B-B14F-4D97-AF65-F5344CB8AC3E}">
+        <p14:creationId xmlns:p14="http://schemas.microsoft.com/office/powerpoint/2010/main" val="3834784446"/>
+      </p:ext>
+    </p:extLst>
+  </p:cSld>
+  <p:clrMapOvr>
+    <a:masterClrMapping/>
+  </p:clrMapOvr>
+</p:notes>
+</file>
+
+<file path=ppt/notesSlides/notesSlide6.xml><?xml version="1.0" encoding="utf-8"?>
+<p:notes xmlns:a="http://schemas.openxmlformats.org/drawingml/2006/main" xmlns:r="http://schemas.openxmlformats.org/officeDocument/2006/relationships" xmlns:p="http://schemas.openxmlformats.org/presentationml/2006/main">
+  <p:cSld>
+    <p:spTree>
+      <p:nvGrpSpPr>
+        <p:cNvPr id="1" name=""/>
+        <p:cNvGrpSpPr/>
+        <p:nvPr/>
+      </p:nvGrpSpPr>
+      <p:grpSpPr>
+        <a:xfrm>
+          <a:off x="0" y="0"/>
+          <a:ext cx="0" cy="0"/>
+          <a:chOff x="0" y="0"/>
+          <a:chExt cx="0" cy="0"/>
+        </a:xfrm>
+      </p:grpSpPr>
+      <p:sp>
+        <p:nvSpPr>
+          <p:cNvPr id="2" name="Slide Image Placeholder 1"/>
+          <p:cNvSpPr>
+            <a:spLocks noGrp="1" noRot="1" noChangeAspect="1"/>
+          </p:cNvSpPr>
+          <p:nvPr>
+            <p:ph type="sldImg"/>
+          </p:nvPr>
+        </p:nvSpPr>
+        <p:spPr/>
+      </p:sp>
+      <p:sp>
+        <p:nvSpPr>
+          <p:cNvPr id="3" name="Notes Placeholder 2"/>
+          <p:cNvSpPr>
+            <a:spLocks noGrp="1"/>
+          </p:cNvSpPr>
+          <p:nvPr>
+            <p:ph type="body" idx="1"/>
+          </p:nvPr>
+        </p:nvSpPr>
+        <p:spPr/>
+        <p:txBody>
+          <a:bodyPr/>
+          <a:lstStyle/>
+          <a:p>
+            <a:endParaRPr lang="en-US" dirty="0"/>
+          </a:p>
+        </p:txBody>
+      </p:sp>
+      <p:sp>
+        <p:nvSpPr>
+          <p:cNvPr id="4" name="Slide Number Placeholder 3"/>
+          <p:cNvSpPr>
+            <a:spLocks noGrp="1"/>
+          </p:cNvSpPr>
+          <p:nvPr>
+            <p:ph type="sldNum" sz="quarter" idx="5"/>
+          </p:nvPr>
+        </p:nvSpPr>
+        <p:spPr/>
+        <p:txBody>
+          <a:bodyPr/>
+          <a:lstStyle/>
+          <a:p>
+            <a:fld id="{3F8BDF20-BE86-4883-8A23-4CE3D0058BEA}" type="slidenum">
+              <a:rPr lang="en-US" smtClean="0"/>
+              <a:t>17</a:t>
+            </a:fld>
+            <a:endParaRPr lang="en-US"/>
+          </a:p>
+        </p:txBody>
+      </p:sp>
+    </p:spTree>
+    <p:extLst>
+      <p:ext uri="{BB962C8B-B14F-4D97-AF65-F5344CB8AC3E}">
+        <p14:creationId xmlns:p14="http://schemas.microsoft.com/office/powerpoint/2010/main" val="1717900221"/>
       </p:ext>
     </p:extLst>
   </p:cSld>
@@ -3760,6 +4102,145 @@
             <p:ph type="title"/>
           </p:nvPr>
         </p:nvSpPr>
+        <p:spPr/>
+        <p:txBody>
+          <a:bodyPr/>
+          <a:lstStyle/>
+          <a:p>
+            <a:r>
+              <a:rPr lang="en-US" dirty="0"/>
+              <a:t>Textbooks</a:t>
+            </a:r>
+          </a:p>
+        </p:txBody>
+      </p:sp>
+      <p:sp>
+        <p:nvSpPr>
+          <p:cNvPr id="7" name="Content Placeholder 3">
+            <a:extLst>
+              <a:ext uri="{FF2B5EF4-FFF2-40B4-BE49-F238E27FC236}">
+                <a16:creationId xmlns:a16="http://schemas.microsoft.com/office/drawing/2014/main" id="{C4C2037F-909E-E840-8A09-C2EF77C2CBAC}"/>
+              </a:ext>
+            </a:extLst>
+          </p:cNvPr>
+          <p:cNvSpPr>
+            <a:spLocks noGrp="1"/>
+          </p:cNvSpPr>
+          <p:nvPr>
+            <p:ph idx="1"/>
+          </p:nvPr>
+        </p:nvSpPr>
+        <p:spPr>
+          <a:xfrm>
+            <a:off x="838200" y="1918652"/>
+            <a:ext cx="10515600" cy="3020695"/>
+          </a:xfrm>
+        </p:spPr>
+        <p:txBody>
+          <a:bodyPr>
+            <a:normAutofit/>
+          </a:bodyPr>
+          <a:lstStyle/>
+          <a:p>
+            <a:r>
+              <a:rPr lang="en-US" dirty="0"/>
+              <a:t>An Introduction to Statistical Learning</a:t>
+            </a:r>
+          </a:p>
+          <a:p>
+            <a:endParaRPr lang="en-US" dirty="0"/>
+          </a:p>
+          <a:p>
+            <a:r>
+              <a:rPr lang="en-US" dirty="0"/>
+              <a:t>Machine Learning with Python Tutorial (Optional)</a:t>
+            </a:r>
+          </a:p>
+        </p:txBody>
+      </p:sp>
+      <p:sp>
+        <p:nvSpPr>
+          <p:cNvPr id="8" name="TextBox 7">
+            <a:extLst>
+              <a:ext uri="{FF2B5EF4-FFF2-40B4-BE49-F238E27FC236}">
+                <a16:creationId xmlns:a16="http://schemas.microsoft.com/office/drawing/2014/main" id="{C7F910D6-5D5C-424B-BE21-E59B9B3E45A4}"/>
+              </a:ext>
+            </a:extLst>
+          </p:cNvPr>
+          <p:cNvSpPr txBox="1"/>
+          <p:nvPr/>
+        </p:nvSpPr>
+        <p:spPr>
+          <a:xfrm>
+            <a:off x="838200" y="4188122"/>
+            <a:ext cx="9159240" cy="461665"/>
+          </a:xfrm>
+          <a:prstGeom prst="rect">
+            <a:avLst/>
+          </a:prstGeom>
+          <a:noFill/>
+        </p:spPr>
+        <p:txBody>
+          <a:bodyPr wrap="square">
+            <a:spAutoFit/>
+          </a:bodyPr>
+          <a:lstStyle/>
+          <a:p>
+            <a:r>
+              <a:rPr lang="en-US" sz="2400" dirty="0"/>
+              <a:t>https://tianzheng4.github.io/</a:t>
+            </a:r>
+            <a:r>
+              <a:rPr lang="en-US" sz="2400" dirty="0" err="1"/>
+              <a:t>umkc</a:t>
+            </a:r>
+            <a:r>
+              <a:rPr lang="en-US" sz="2400" dirty="0"/>
+              <a:t>-teaching/2023-fall-teaching-1/</a:t>
+            </a:r>
+          </a:p>
+        </p:txBody>
+      </p:sp>
+    </p:spTree>
+    <p:extLst>
+      <p:ext uri="{BB962C8B-B14F-4D97-AF65-F5344CB8AC3E}">
+        <p14:creationId xmlns:p14="http://schemas.microsoft.com/office/powerpoint/2010/main" val="1327267736"/>
+      </p:ext>
+    </p:extLst>
+  </p:cSld>
+  <p:clrMapOvr>
+    <a:masterClrMapping/>
+  </p:clrMapOvr>
+</p:sld>
+</file>
+
+<file path=ppt/slides/slide11.xml><?xml version="1.0" encoding="utf-8"?>
+<p:sld xmlns:a="http://schemas.openxmlformats.org/drawingml/2006/main" xmlns:r="http://schemas.openxmlformats.org/officeDocument/2006/relationships" xmlns:p="http://schemas.openxmlformats.org/presentationml/2006/main">
+  <p:cSld>
+    <p:spTree>
+      <p:nvGrpSpPr>
+        <p:cNvPr id="1" name=""/>
+        <p:cNvGrpSpPr/>
+        <p:nvPr/>
+      </p:nvGrpSpPr>
+      <p:grpSpPr>
+        <a:xfrm>
+          <a:off x="0" y="0"/>
+          <a:ext cx="0" cy="0"/>
+          <a:chOff x="0" y="0"/>
+          <a:chExt cx="0" cy="0"/>
+        </a:xfrm>
+      </p:grpSpPr>
+      <p:sp>
+        <p:nvSpPr>
+          <p:cNvPr id="2" name="Title 1"/>
+          <p:cNvSpPr>
+            <a:spLocks noGrp="1"/>
+          </p:cNvSpPr>
+          <p:nvPr>
+            <p:ph type="title"/>
+          </p:nvPr>
+        </p:nvSpPr>
         <p:spPr>
           <a:xfrm>
             <a:off x="838200" y="365126"/>
@@ -3774,7 +4255,7 @@
           <a:p>
             <a:r>
               <a:rPr lang="en-US" dirty="0"/>
-              <a:t>Learning Problems: Supervised Learning</a:t>
+              <a:t>Supervised Learning</a:t>
             </a:r>
           </a:p>
         </p:txBody>
@@ -3950,7 +4431,7 @@
 </p:sld>
 </file>
 
-<file path=ppt/slides/slide11.xml><?xml version="1.0" encoding="utf-8"?>
+<file path=ppt/slides/slide12.xml><?xml version="1.0" encoding="utf-8"?>
 <p:sld xmlns:a="http://schemas.openxmlformats.org/drawingml/2006/main" xmlns:r="http://schemas.openxmlformats.org/officeDocument/2006/relationships" xmlns:p="http://schemas.openxmlformats.org/presentationml/2006/main">
   <p:cSld>
     <p:spTree>
@@ -4572,7 +5053,7 @@
 </p:sld>
 </file>
 
-<file path=ppt/slides/slide12.xml><?xml version="1.0" encoding="utf-8"?>
+<file path=ppt/slides/slide13.xml><?xml version="1.0" encoding="utf-8"?>
 <p:sld xmlns:a="http://schemas.openxmlformats.org/drawingml/2006/main" xmlns:r="http://schemas.openxmlformats.org/officeDocument/2006/relationships" xmlns:p="http://schemas.openxmlformats.org/presentationml/2006/main">
   <p:cSld>
     <p:spTree>
@@ -4613,7 +5094,7 @@
           <a:p>
             <a:r>
               <a:rPr lang="en-US" dirty="0"/>
-              <a:t>Learning Problems: Unsupervised Learning</a:t>
+              <a:t>Unsupervised Learning</a:t>
             </a:r>
           </a:p>
         </p:txBody>
@@ -4780,7 +5261,1295 @@
 </p:sld>
 </file>
 
-<file path=ppt/slides/slide13.xml><?xml version="1.0" encoding="utf-8"?>
+<file path=ppt/slides/slide14.xml><?xml version="1.0" encoding="utf-8"?>
+<p:sld xmlns:a="http://schemas.openxmlformats.org/drawingml/2006/main" xmlns:r="http://schemas.openxmlformats.org/officeDocument/2006/relationships" xmlns:p="http://schemas.openxmlformats.org/presentationml/2006/main">
+  <p:cSld>
+    <p:spTree>
+      <p:nvGrpSpPr>
+        <p:cNvPr id="1" name=""/>
+        <p:cNvGrpSpPr/>
+        <p:nvPr/>
+      </p:nvGrpSpPr>
+      <p:grpSpPr>
+        <a:xfrm>
+          <a:off x="0" y="0"/>
+          <a:ext cx="0" cy="0"/>
+          <a:chOff x="0" y="0"/>
+          <a:chExt cx="0" cy="0"/>
+        </a:xfrm>
+      </p:grpSpPr>
+      <p:sp>
+        <p:nvSpPr>
+          <p:cNvPr id="2" name="Title 1"/>
+          <p:cNvSpPr>
+            <a:spLocks noGrp="1"/>
+          </p:cNvSpPr>
+          <p:nvPr>
+            <p:ph type="title"/>
+          </p:nvPr>
+        </p:nvSpPr>
+        <p:spPr>
+          <a:xfrm>
+            <a:off x="838200" y="365126"/>
+            <a:ext cx="10515600" cy="981894"/>
+          </a:xfrm>
+        </p:spPr>
+        <p:txBody>
+          <a:bodyPr>
+            <a:normAutofit/>
+          </a:bodyPr>
+          <a:lstStyle/>
+          <a:p>
+            <a:r>
+              <a:rPr lang="en-US" dirty="0"/>
+              <a:t>Unsupervised Learning</a:t>
+            </a:r>
+          </a:p>
+        </p:txBody>
+      </p:sp>
+      <p:pic>
+        <p:nvPicPr>
+          <p:cNvPr id="5122" name="Picture 2" descr="The Beginner's Guide to Contrastive Learning">
+            <a:extLst>
+              <a:ext uri="{FF2B5EF4-FFF2-40B4-BE49-F238E27FC236}">
+                <a16:creationId xmlns:a16="http://schemas.microsoft.com/office/drawing/2014/main" id="{B254A1C9-1A97-2749-ADE3-C2308FA8F835}"/>
+              </a:ext>
+            </a:extLst>
+          </p:cNvPr>
+          <p:cNvPicPr>
+            <a:picLocks noChangeAspect="1" noChangeArrowheads="1"/>
+          </p:cNvPicPr>
+          <p:nvPr/>
+        </p:nvPicPr>
+        <p:blipFill>
+          <a:blip r:embed="rId3">
+            <a:extLst>
+              <a:ext uri="{28A0092B-C50C-407E-A947-70E740481C1C}">
+                <a14:useLocalDpi xmlns:a14="http://schemas.microsoft.com/office/drawing/2010/main" val="0"/>
+              </a:ext>
+            </a:extLst>
+          </a:blip>
+          <a:srcRect/>
+          <a:stretch>
+            <a:fillRect/>
+          </a:stretch>
+        </p:blipFill>
+        <p:spPr bwMode="auto">
+          <a:xfrm>
+            <a:off x="2357439" y="1632319"/>
+            <a:ext cx="7182802" cy="5046301"/>
+          </a:xfrm>
+          <a:prstGeom prst="rect">
+            <a:avLst/>
+          </a:prstGeom>
+          <a:noFill/>
+          <a:extLst>
+            <a:ext uri="{909E8E84-426E-40DD-AFC4-6F175D3DCCD1}">
+              <a14:hiddenFill xmlns:a14="http://schemas.microsoft.com/office/drawing/2010/main">
+                <a:solidFill>
+                  <a:srgbClr val="FFFFFF"/>
+                </a:solidFill>
+              </a14:hiddenFill>
+            </a:ext>
+          </a:extLst>
+        </p:spPr>
+      </p:pic>
+    </p:spTree>
+    <p:extLst>
+      <p:ext uri="{BB962C8B-B14F-4D97-AF65-F5344CB8AC3E}">
+        <p14:creationId xmlns:p14="http://schemas.microsoft.com/office/powerpoint/2010/main" val="1714350462"/>
+      </p:ext>
+    </p:extLst>
+  </p:cSld>
+  <p:clrMapOvr>
+    <a:masterClrMapping/>
+  </p:clrMapOvr>
+</p:sld>
+</file>
+
+<file path=ppt/slides/slide15.xml><?xml version="1.0" encoding="utf-8"?>
+<p:sld xmlns:a="http://schemas.openxmlformats.org/drawingml/2006/main" xmlns:r="http://schemas.openxmlformats.org/officeDocument/2006/relationships" xmlns:p="http://schemas.openxmlformats.org/presentationml/2006/main">
+  <p:cSld>
+    <p:spTree>
+      <p:nvGrpSpPr>
+        <p:cNvPr id="1" name=""/>
+        <p:cNvGrpSpPr/>
+        <p:nvPr/>
+      </p:nvGrpSpPr>
+      <p:grpSpPr>
+        <a:xfrm>
+          <a:off x="0" y="0"/>
+          <a:ext cx="0" cy="0"/>
+          <a:chOff x="0" y="0"/>
+          <a:chExt cx="0" cy="0"/>
+        </a:xfrm>
+      </p:grpSpPr>
+      <p:sp>
+        <p:nvSpPr>
+          <p:cNvPr id="2" name="Title 1"/>
+          <p:cNvSpPr>
+            <a:spLocks noGrp="1"/>
+          </p:cNvSpPr>
+          <p:nvPr>
+            <p:ph type="title"/>
+          </p:nvPr>
+        </p:nvSpPr>
+        <p:spPr>
+          <a:xfrm>
+            <a:off x="838200" y="365126"/>
+            <a:ext cx="10515600" cy="981894"/>
+          </a:xfrm>
+        </p:spPr>
+        <p:txBody>
+          <a:bodyPr>
+            <a:normAutofit/>
+          </a:bodyPr>
+          <a:lstStyle/>
+          <a:p>
+            <a:r>
+              <a:rPr lang="en-US" dirty="0"/>
+              <a:t>Semi-Supervised Learning</a:t>
+            </a:r>
+          </a:p>
+        </p:txBody>
+      </p:sp>
+      <p:sp>
+        <p:nvSpPr>
+          <p:cNvPr id="6" name="TextBox 5">
+            <a:extLst>
+              <a:ext uri="{FF2B5EF4-FFF2-40B4-BE49-F238E27FC236}">
+                <a16:creationId xmlns:a16="http://schemas.microsoft.com/office/drawing/2014/main" id="{EC0DB0EB-DD26-0447-9E11-1234B0A5DCA6}"/>
+              </a:ext>
+            </a:extLst>
+          </p:cNvPr>
+          <p:cNvSpPr txBox="1"/>
+          <p:nvPr/>
+        </p:nvSpPr>
+        <p:spPr>
+          <a:xfrm>
+            <a:off x="838200" y="1347020"/>
+            <a:ext cx="9646920" cy="1771767"/>
+          </a:xfrm>
+          <a:prstGeom prst="rect">
+            <a:avLst/>
+          </a:prstGeom>
+          <a:noFill/>
+        </p:spPr>
+        <p:txBody>
+          <a:bodyPr wrap="square">
+            <a:spAutoFit/>
+          </a:bodyPr>
+          <a:lstStyle/>
+          <a:p>
+            <a:pPr marL="228600" marR="0" lvl="0" indent="-228600" algn="l" defTabSz="914400" rtl="0" eaLnBrk="1" fontAlgn="auto" latinLnBrk="0" hangingPunct="1">
+              <a:lnSpc>
+                <a:spcPct val="90000"/>
+              </a:lnSpc>
+              <a:spcBef>
+                <a:spcPts val="1000"/>
+              </a:spcBef>
+              <a:spcAft>
+                <a:spcPts val="0"/>
+              </a:spcAft>
+              <a:buClrTx/>
+              <a:buSzTx/>
+              <a:buFont typeface="Arial" panose="020B0604020202020204" pitchFamily="34" charset="0"/>
+              <a:buChar char="•"/>
+              <a:tabLst/>
+              <a:defRPr/>
+            </a:pPr>
+            <a:r>
+              <a:rPr kumimoji="0" lang="en-US" sz="2800" b="0" i="0" u="none" strike="noStrike" kern="1200" cap="none" spc="0" normalizeH="0" baseline="0" noProof="0" dirty="0">
+                <a:ln>
+                  <a:noFill/>
+                </a:ln>
+                <a:solidFill>
+                  <a:prstClr val="black"/>
+                </a:solidFill>
+                <a:effectLst/>
+                <a:uLnTx/>
+                <a:uFillTx/>
+                <a:latin typeface="Calibri" panose="020F0502020204030204"/>
+                <a:ea typeface="+mn-ea"/>
+                <a:cs typeface="+mn-cs"/>
+              </a:rPr>
+              <a:t>Semi-supervised learning can be viewed as a mix of supervised and unsupervised learning.</a:t>
+            </a:r>
+          </a:p>
+          <a:p>
+            <a:pPr marL="228600" marR="0" lvl="0" indent="-228600" algn="l" defTabSz="914400" rtl="0" eaLnBrk="1" fontAlgn="auto" latinLnBrk="0" hangingPunct="1">
+              <a:lnSpc>
+                <a:spcPct val="90000"/>
+              </a:lnSpc>
+              <a:spcBef>
+                <a:spcPts val="1000"/>
+              </a:spcBef>
+              <a:spcAft>
+                <a:spcPts val="0"/>
+              </a:spcAft>
+              <a:buClrTx/>
+              <a:buSzTx/>
+              <a:buFont typeface="Arial" panose="020B0604020202020204" pitchFamily="34" charset="0"/>
+              <a:buChar char="•"/>
+              <a:tabLst/>
+              <a:defRPr/>
+            </a:pPr>
+            <a:r>
+              <a:rPr kumimoji="0" lang="en-US" sz="2800" b="0" i="0" u="none" strike="noStrike" kern="1200" cap="none" spc="0" normalizeH="0" baseline="0" noProof="0" dirty="0">
+                <a:ln>
+                  <a:noFill/>
+                </a:ln>
+                <a:solidFill>
+                  <a:prstClr val="black"/>
+                </a:solidFill>
+                <a:effectLst/>
+                <a:uLnTx/>
+                <a:uFillTx/>
+                <a:latin typeface="Calibri" panose="020F0502020204030204"/>
+                <a:ea typeface="+mn-ea"/>
+                <a:cs typeface="+mn-cs"/>
+              </a:rPr>
+              <a:t>In semi-supervised learning tasks, some training examples have outcomes, but some do not.</a:t>
+            </a:r>
+          </a:p>
+        </p:txBody>
+      </p:sp>
+      <p:pic>
+        <p:nvPicPr>
+          <p:cNvPr id="6148" name="Picture 4" descr="Introduction to Semi-Supervised Learning | TeksandsAItest">
+            <a:extLst>
+              <a:ext uri="{FF2B5EF4-FFF2-40B4-BE49-F238E27FC236}">
+                <a16:creationId xmlns:a16="http://schemas.microsoft.com/office/drawing/2014/main" id="{529F1B35-50BB-0B46-9E82-BA974C92A775}"/>
+              </a:ext>
+            </a:extLst>
+          </p:cNvPr>
+          <p:cNvPicPr>
+            <a:picLocks noChangeAspect="1" noChangeArrowheads="1"/>
+          </p:cNvPicPr>
+          <p:nvPr/>
+        </p:nvPicPr>
+        <p:blipFill rotWithShape="1">
+          <a:blip r:embed="rId3">
+            <a:extLst>
+              <a:ext uri="{28A0092B-C50C-407E-A947-70E740481C1C}">
+                <a14:useLocalDpi xmlns:a14="http://schemas.microsoft.com/office/drawing/2010/main" val="0"/>
+              </a:ext>
+            </a:extLst>
+          </a:blip>
+          <a:srcRect t="11066" b="9819"/>
+          <a:stretch/>
+        </p:blipFill>
+        <p:spPr bwMode="auto">
+          <a:xfrm>
+            <a:off x="1920240" y="3430121"/>
+            <a:ext cx="8351520" cy="3303670"/>
+          </a:xfrm>
+          <a:prstGeom prst="rect">
+            <a:avLst/>
+          </a:prstGeom>
+          <a:noFill/>
+          <a:extLst>
+            <a:ext uri="{909E8E84-426E-40DD-AFC4-6F175D3DCCD1}">
+              <a14:hiddenFill xmlns:a14="http://schemas.microsoft.com/office/drawing/2010/main">
+                <a:solidFill>
+                  <a:srgbClr val="FFFFFF"/>
+                </a:solidFill>
+              </a14:hiddenFill>
+            </a:ext>
+          </a:extLst>
+        </p:spPr>
+      </p:pic>
+    </p:spTree>
+    <p:extLst>
+      <p:ext uri="{BB962C8B-B14F-4D97-AF65-F5344CB8AC3E}">
+        <p14:creationId xmlns:p14="http://schemas.microsoft.com/office/powerpoint/2010/main" val="312799993"/>
+      </p:ext>
+    </p:extLst>
+  </p:cSld>
+  <p:clrMapOvr>
+    <a:masterClrMapping/>
+  </p:clrMapOvr>
+</p:sld>
+</file>
+
+<file path=ppt/slides/slide16.xml><?xml version="1.0" encoding="utf-8"?>
+<p:sld xmlns:a="http://schemas.openxmlformats.org/drawingml/2006/main" xmlns:r="http://schemas.openxmlformats.org/officeDocument/2006/relationships" xmlns:p="http://schemas.openxmlformats.org/presentationml/2006/main">
+  <p:cSld>
+    <p:spTree>
+      <p:nvGrpSpPr>
+        <p:cNvPr id="1" name=""/>
+        <p:cNvGrpSpPr/>
+        <p:nvPr/>
+      </p:nvGrpSpPr>
+      <p:grpSpPr>
+        <a:xfrm>
+          <a:off x="0" y="0"/>
+          <a:ext cx="0" cy="0"/>
+          <a:chOff x="0" y="0"/>
+          <a:chExt cx="0" cy="0"/>
+        </a:xfrm>
+      </p:grpSpPr>
+      <p:sp>
+        <p:nvSpPr>
+          <p:cNvPr id="2" name="Title 1"/>
+          <p:cNvSpPr>
+            <a:spLocks noGrp="1"/>
+          </p:cNvSpPr>
+          <p:nvPr>
+            <p:ph type="title"/>
+          </p:nvPr>
+        </p:nvSpPr>
+        <p:spPr>
+          <a:xfrm>
+            <a:off x="838200" y="365126"/>
+            <a:ext cx="10515600" cy="981894"/>
+          </a:xfrm>
+        </p:spPr>
+        <p:txBody>
+          <a:bodyPr>
+            <a:normAutofit/>
+          </a:bodyPr>
+          <a:lstStyle/>
+          <a:p>
+            <a:r>
+              <a:rPr lang="en-US" dirty="0"/>
+              <a:t>Reinforcement Learning</a:t>
+            </a:r>
+          </a:p>
+        </p:txBody>
+      </p:sp>
+      <p:pic>
+        <p:nvPicPr>
+          <p:cNvPr id="7170" name="Picture 2" descr="Reinforcement Learning 101. Learn the essentials of Reinforcement… | by  Shweta Bhatt | Towards Data Science">
+            <a:extLst>
+              <a:ext uri="{FF2B5EF4-FFF2-40B4-BE49-F238E27FC236}">
+                <a16:creationId xmlns:a16="http://schemas.microsoft.com/office/drawing/2014/main" id="{526AEDFA-D9FC-2241-9A8F-C7732DB90277}"/>
+              </a:ext>
+            </a:extLst>
+          </p:cNvPr>
+          <p:cNvPicPr>
+            <a:picLocks noChangeAspect="1" noChangeArrowheads="1"/>
+          </p:cNvPicPr>
+          <p:nvPr/>
+        </p:nvPicPr>
+        <p:blipFill>
+          <a:blip r:embed="rId3">
+            <a:extLst>
+              <a:ext uri="{28A0092B-C50C-407E-A947-70E740481C1C}">
+                <a14:useLocalDpi xmlns:a14="http://schemas.microsoft.com/office/drawing/2010/main" val="0"/>
+              </a:ext>
+            </a:extLst>
+          </a:blip>
+          <a:srcRect/>
+          <a:stretch>
+            <a:fillRect/>
+          </a:stretch>
+        </p:blipFill>
+        <p:spPr bwMode="auto">
+          <a:xfrm>
+            <a:off x="1579880" y="2014220"/>
+            <a:ext cx="8138015" cy="3136900"/>
+          </a:xfrm>
+          <a:prstGeom prst="rect">
+            <a:avLst/>
+          </a:prstGeom>
+          <a:noFill/>
+          <a:extLst>
+            <a:ext uri="{909E8E84-426E-40DD-AFC4-6F175D3DCCD1}">
+              <a14:hiddenFill xmlns:a14="http://schemas.microsoft.com/office/drawing/2010/main">
+                <a:solidFill>
+                  <a:srgbClr val="FFFFFF"/>
+                </a:solidFill>
+              </a14:hiddenFill>
+            </a:ext>
+          </a:extLst>
+        </p:spPr>
+      </p:pic>
+    </p:spTree>
+    <p:extLst>
+      <p:ext uri="{BB962C8B-B14F-4D97-AF65-F5344CB8AC3E}">
+        <p14:creationId xmlns:p14="http://schemas.microsoft.com/office/powerpoint/2010/main" val="3752756850"/>
+      </p:ext>
+    </p:extLst>
+  </p:cSld>
+  <p:clrMapOvr>
+    <a:masterClrMapping/>
+  </p:clrMapOvr>
+</p:sld>
+</file>
+
+<file path=ppt/slides/slide17.xml><?xml version="1.0" encoding="utf-8"?>
+<p:sld xmlns:a="http://schemas.openxmlformats.org/drawingml/2006/main" xmlns:r="http://schemas.openxmlformats.org/officeDocument/2006/relationships" xmlns:p="http://schemas.openxmlformats.org/presentationml/2006/main">
+  <p:cSld>
+    <p:spTree>
+      <p:nvGrpSpPr>
+        <p:cNvPr id="1" name=""/>
+        <p:cNvGrpSpPr/>
+        <p:nvPr/>
+      </p:nvGrpSpPr>
+      <p:grpSpPr>
+        <a:xfrm>
+          <a:off x="0" y="0"/>
+          <a:ext cx="0" cy="0"/>
+          <a:chOff x="0" y="0"/>
+          <a:chExt cx="0" cy="0"/>
+        </a:xfrm>
+      </p:grpSpPr>
+      <p:sp>
+        <p:nvSpPr>
+          <p:cNvPr id="2" name="Title 1"/>
+          <p:cNvSpPr>
+            <a:spLocks noGrp="1"/>
+          </p:cNvSpPr>
+          <p:nvPr>
+            <p:ph type="title"/>
+          </p:nvPr>
+        </p:nvSpPr>
+        <p:spPr>
+          <a:xfrm>
+            <a:off x="838200" y="365126"/>
+            <a:ext cx="10515600" cy="981894"/>
+          </a:xfrm>
+        </p:spPr>
+        <p:txBody>
+          <a:bodyPr>
+            <a:normAutofit/>
+          </a:bodyPr>
+          <a:lstStyle/>
+          <a:p>
+            <a:r>
+              <a:rPr lang="en-US" dirty="0"/>
+              <a:t>Category of learning problems</a:t>
+            </a:r>
+          </a:p>
+        </p:txBody>
+      </p:sp>
+      <p:sp>
+        <p:nvSpPr>
+          <p:cNvPr id="4" name="Content Placeholder 2">
+            <a:extLst>
+              <a:ext uri="{FF2B5EF4-FFF2-40B4-BE49-F238E27FC236}">
+                <a16:creationId xmlns:a16="http://schemas.microsoft.com/office/drawing/2014/main" id="{E965F214-522A-E447-96E4-309B7A1596FF}"/>
+              </a:ext>
+            </a:extLst>
+          </p:cNvPr>
+          <p:cNvSpPr txBox="1">
+            <a:spLocks/>
+          </p:cNvSpPr>
+          <p:nvPr/>
+        </p:nvSpPr>
+        <p:spPr>
+          <a:xfrm>
+            <a:off x="975360" y="1992601"/>
+            <a:ext cx="9616440" cy="852100"/>
+          </a:xfrm>
+          <a:prstGeom prst="rect">
+            <a:avLst/>
+          </a:prstGeom>
+        </p:spPr>
+        <p:txBody>
+          <a:bodyPr vert="horz" lIns="91440" tIns="45720" rIns="91440" bIns="45720" rtlCol="0">
+            <a:normAutofit/>
+          </a:bodyPr>
+          <a:lstStyle>
+            <a:lvl1pPr marL="228600" indent="-228600" algn="l" defTabSz="914400" rtl="0" eaLnBrk="1" latinLnBrk="0" hangingPunct="1">
+              <a:lnSpc>
+                <a:spcPct val="90000"/>
+              </a:lnSpc>
+              <a:spcBef>
+                <a:spcPts val="1000"/>
+              </a:spcBef>
+              <a:buFont typeface="Arial" panose="020B0604020202020204" pitchFamily="34" charset="0"/>
+              <a:buChar char="•"/>
+              <a:defRPr sz="2800" kern="1200">
+                <a:solidFill>
+                  <a:schemeClr val="tx1"/>
+                </a:solidFill>
+                <a:latin typeface="+mn-lt"/>
+                <a:ea typeface="+mn-ea"/>
+                <a:cs typeface="+mn-cs"/>
+              </a:defRPr>
+            </a:lvl1pPr>
+            <a:lvl2pPr marL="685800" indent="-228600" algn="l" defTabSz="914400" rtl="0" eaLnBrk="1" latinLnBrk="0" hangingPunct="1">
+              <a:lnSpc>
+                <a:spcPct val="90000"/>
+              </a:lnSpc>
+              <a:spcBef>
+                <a:spcPts val="500"/>
+              </a:spcBef>
+              <a:buFont typeface="Arial" panose="020B0604020202020204" pitchFamily="34" charset="0"/>
+              <a:buChar char="•"/>
+              <a:defRPr sz="2400" kern="1200">
+                <a:solidFill>
+                  <a:schemeClr val="tx1"/>
+                </a:solidFill>
+                <a:latin typeface="+mn-lt"/>
+                <a:ea typeface="+mn-ea"/>
+                <a:cs typeface="+mn-cs"/>
+              </a:defRPr>
+            </a:lvl2pPr>
+            <a:lvl3pPr marL="1143000" indent="-228600" algn="l" defTabSz="914400" rtl="0" eaLnBrk="1" latinLnBrk="0" hangingPunct="1">
+              <a:lnSpc>
+                <a:spcPct val="90000"/>
+              </a:lnSpc>
+              <a:spcBef>
+                <a:spcPts val="500"/>
+              </a:spcBef>
+              <a:buFont typeface="Arial" panose="020B0604020202020204" pitchFamily="34" charset="0"/>
+              <a:buChar char="•"/>
+              <a:defRPr sz="2000" kern="1200">
+                <a:solidFill>
+                  <a:schemeClr val="tx1"/>
+                </a:solidFill>
+                <a:latin typeface="+mn-lt"/>
+                <a:ea typeface="+mn-ea"/>
+                <a:cs typeface="+mn-cs"/>
+              </a:defRPr>
+            </a:lvl3pPr>
+            <a:lvl4pPr marL="1600200" indent="-228600" algn="l" defTabSz="914400" rtl="0" eaLnBrk="1" latinLnBrk="0" hangingPunct="1">
+              <a:lnSpc>
+                <a:spcPct val="90000"/>
+              </a:lnSpc>
+              <a:spcBef>
+                <a:spcPts val="500"/>
+              </a:spcBef>
+              <a:buFont typeface="Arial" panose="020B0604020202020204" pitchFamily="34" charset="0"/>
+              <a:buChar char="•"/>
+              <a:defRPr sz="1800" kern="1200">
+                <a:solidFill>
+                  <a:schemeClr val="tx1"/>
+                </a:solidFill>
+                <a:latin typeface="+mn-lt"/>
+                <a:ea typeface="+mn-ea"/>
+                <a:cs typeface="+mn-cs"/>
+              </a:defRPr>
+            </a:lvl4pPr>
+            <a:lvl5pPr marL="2057400" indent="-228600" algn="l" defTabSz="914400" rtl="0" eaLnBrk="1" latinLnBrk="0" hangingPunct="1">
+              <a:lnSpc>
+                <a:spcPct val="90000"/>
+              </a:lnSpc>
+              <a:spcBef>
+                <a:spcPts val="500"/>
+              </a:spcBef>
+              <a:buFont typeface="Arial" panose="020B0604020202020204" pitchFamily="34" charset="0"/>
+              <a:buChar char="•"/>
+              <a:defRPr sz="1800" kern="1200">
+                <a:solidFill>
+                  <a:schemeClr val="tx1"/>
+                </a:solidFill>
+                <a:latin typeface="+mn-lt"/>
+                <a:ea typeface="+mn-ea"/>
+                <a:cs typeface="+mn-cs"/>
+              </a:defRPr>
+            </a:lvl5pPr>
+            <a:lvl6pPr marL="2514600" indent="-228600" algn="l" defTabSz="914400" rtl="0" eaLnBrk="1" latinLnBrk="0" hangingPunct="1">
+              <a:lnSpc>
+                <a:spcPct val="90000"/>
+              </a:lnSpc>
+              <a:spcBef>
+                <a:spcPts val="500"/>
+              </a:spcBef>
+              <a:buFont typeface="Arial" panose="020B0604020202020204" pitchFamily="34" charset="0"/>
+              <a:buChar char="•"/>
+              <a:defRPr sz="1800" kern="1200">
+                <a:solidFill>
+                  <a:schemeClr val="tx1"/>
+                </a:solidFill>
+                <a:latin typeface="+mn-lt"/>
+                <a:ea typeface="+mn-ea"/>
+                <a:cs typeface="+mn-cs"/>
+              </a:defRPr>
+            </a:lvl6pPr>
+            <a:lvl7pPr marL="2971800" indent="-228600" algn="l" defTabSz="914400" rtl="0" eaLnBrk="1" latinLnBrk="0" hangingPunct="1">
+              <a:lnSpc>
+                <a:spcPct val="90000"/>
+              </a:lnSpc>
+              <a:spcBef>
+                <a:spcPts val="500"/>
+              </a:spcBef>
+              <a:buFont typeface="Arial" panose="020B0604020202020204" pitchFamily="34" charset="0"/>
+              <a:buChar char="•"/>
+              <a:defRPr sz="1800" kern="1200">
+                <a:solidFill>
+                  <a:schemeClr val="tx1"/>
+                </a:solidFill>
+                <a:latin typeface="+mn-lt"/>
+                <a:ea typeface="+mn-ea"/>
+                <a:cs typeface="+mn-cs"/>
+              </a:defRPr>
+            </a:lvl7pPr>
+            <a:lvl8pPr marL="3429000" indent="-228600" algn="l" defTabSz="914400" rtl="0" eaLnBrk="1" latinLnBrk="0" hangingPunct="1">
+              <a:lnSpc>
+                <a:spcPct val="90000"/>
+              </a:lnSpc>
+              <a:spcBef>
+                <a:spcPts val="500"/>
+              </a:spcBef>
+              <a:buFont typeface="Arial" panose="020B0604020202020204" pitchFamily="34" charset="0"/>
+              <a:buChar char="•"/>
+              <a:defRPr sz="1800" kern="1200">
+                <a:solidFill>
+                  <a:schemeClr val="tx1"/>
+                </a:solidFill>
+                <a:latin typeface="+mn-lt"/>
+                <a:ea typeface="+mn-ea"/>
+                <a:cs typeface="+mn-cs"/>
+              </a:defRPr>
+            </a:lvl8pPr>
+            <a:lvl9pPr marL="3886200" indent="-228600" algn="l" defTabSz="914400" rtl="0" eaLnBrk="1" latinLnBrk="0" hangingPunct="1">
+              <a:lnSpc>
+                <a:spcPct val="90000"/>
+              </a:lnSpc>
+              <a:spcBef>
+                <a:spcPts val="500"/>
+              </a:spcBef>
+              <a:buFont typeface="Arial" panose="020B0604020202020204" pitchFamily="34" charset="0"/>
+              <a:buChar char="•"/>
+              <a:defRPr sz="1800" kern="1200">
+                <a:solidFill>
+                  <a:schemeClr val="tx1"/>
+                </a:solidFill>
+                <a:latin typeface="+mn-lt"/>
+                <a:ea typeface="+mn-ea"/>
+                <a:cs typeface="+mn-cs"/>
+              </a:defRPr>
+            </a:lvl9pPr>
+          </a:lstStyle>
+          <a:p>
+            <a:pPr marL="0" indent="0">
+              <a:buFont typeface="Arial" panose="020B0604020202020204" pitchFamily="34" charset="0"/>
+              <a:buNone/>
+            </a:pPr>
+            <a:r>
+              <a:rPr lang="en-US" sz="2400" dirty="0"/>
+              <a:t>Spam Detection: Supervised or Unsupervised?</a:t>
+            </a:r>
+          </a:p>
+        </p:txBody>
+      </p:sp>
+      <p:sp>
+        <p:nvSpPr>
+          <p:cNvPr id="5" name="Content Placeholder 2">
+            <a:extLst>
+              <a:ext uri="{FF2B5EF4-FFF2-40B4-BE49-F238E27FC236}">
+                <a16:creationId xmlns:a16="http://schemas.microsoft.com/office/drawing/2014/main" id="{CBD5C1BA-EACA-1746-ABE0-FCA3417C6CFA}"/>
+              </a:ext>
+            </a:extLst>
+          </p:cNvPr>
+          <p:cNvSpPr txBox="1">
+            <a:spLocks/>
+          </p:cNvSpPr>
+          <p:nvPr/>
+        </p:nvSpPr>
+        <p:spPr>
+          <a:xfrm>
+            <a:off x="975360" y="2844701"/>
+            <a:ext cx="9616440" cy="852100"/>
+          </a:xfrm>
+          <a:prstGeom prst="rect">
+            <a:avLst/>
+          </a:prstGeom>
+        </p:spPr>
+        <p:txBody>
+          <a:bodyPr vert="horz" lIns="91440" tIns="45720" rIns="91440" bIns="45720" rtlCol="0">
+            <a:normAutofit/>
+          </a:bodyPr>
+          <a:lstStyle>
+            <a:lvl1pPr marL="228600" indent="-228600" algn="l" defTabSz="914400" rtl="0" eaLnBrk="1" latinLnBrk="0" hangingPunct="1">
+              <a:lnSpc>
+                <a:spcPct val="90000"/>
+              </a:lnSpc>
+              <a:spcBef>
+                <a:spcPts val="1000"/>
+              </a:spcBef>
+              <a:buFont typeface="Arial" panose="020B0604020202020204" pitchFamily="34" charset="0"/>
+              <a:buChar char="•"/>
+              <a:defRPr sz="2800" kern="1200">
+                <a:solidFill>
+                  <a:schemeClr val="tx1"/>
+                </a:solidFill>
+                <a:latin typeface="+mn-lt"/>
+                <a:ea typeface="+mn-ea"/>
+                <a:cs typeface="+mn-cs"/>
+              </a:defRPr>
+            </a:lvl1pPr>
+            <a:lvl2pPr marL="685800" indent="-228600" algn="l" defTabSz="914400" rtl="0" eaLnBrk="1" latinLnBrk="0" hangingPunct="1">
+              <a:lnSpc>
+                <a:spcPct val="90000"/>
+              </a:lnSpc>
+              <a:spcBef>
+                <a:spcPts val="500"/>
+              </a:spcBef>
+              <a:buFont typeface="Arial" panose="020B0604020202020204" pitchFamily="34" charset="0"/>
+              <a:buChar char="•"/>
+              <a:defRPr sz="2400" kern="1200">
+                <a:solidFill>
+                  <a:schemeClr val="tx1"/>
+                </a:solidFill>
+                <a:latin typeface="+mn-lt"/>
+                <a:ea typeface="+mn-ea"/>
+                <a:cs typeface="+mn-cs"/>
+              </a:defRPr>
+            </a:lvl2pPr>
+            <a:lvl3pPr marL="1143000" indent="-228600" algn="l" defTabSz="914400" rtl="0" eaLnBrk="1" latinLnBrk="0" hangingPunct="1">
+              <a:lnSpc>
+                <a:spcPct val="90000"/>
+              </a:lnSpc>
+              <a:spcBef>
+                <a:spcPts val="500"/>
+              </a:spcBef>
+              <a:buFont typeface="Arial" panose="020B0604020202020204" pitchFamily="34" charset="0"/>
+              <a:buChar char="•"/>
+              <a:defRPr sz="2000" kern="1200">
+                <a:solidFill>
+                  <a:schemeClr val="tx1"/>
+                </a:solidFill>
+                <a:latin typeface="+mn-lt"/>
+                <a:ea typeface="+mn-ea"/>
+                <a:cs typeface="+mn-cs"/>
+              </a:defRPr>
+            </a:lvl3pPr>
+            <a:lvl4pPr marL="1600200" indent="-228600" algn="l" defTabSz="914400" rtl="0" eaLnBrk="1" latinLnBrk="0" hangingPunct="1">
+              <a:lnSpc>
+                <a:spcPct val="90000"/>
+              </a:lnSpc>
+              <a:spcBef>
+                <a:spcPts val="500"/>
+              </a:spcBef>
+              <a:buFont typeface="Arial" panose="020B0604020202020204" pitchFamily="34" charset="0"/>
+              <a:buChar char="•"/>
+              <a:defRPr sz="1800" kern="1200">
+                <a:solidFill>
+                  <a:schemeClr val="tx1"/>
+                </a:solidFill>
+                <a:latin typeface="+mn-lt"/>
+                <a:ea typeface="+mn-ea"/>
+                <a:cs typeface="+mn-cs"/>
+              </a:defRPr>
+            </a:lvl4pPr>
+            <a:lvl5pPr marL="2057400" indent="-228600" algn="l" defTabSz="914400" rtl="0" eaLnBrk="1" latinLnBrk="0" hangingPunct="1">
+              <a:lnSpc>
+                <a:spcPct val="90000"/>
+              </a:lnSpc>
+              <a:spcBef>
+                <a:spcPts val="500"/>
+              </a:spcBef>
+              <a:buFont typeface="Arial" panose="020B0604020202020204" pitchFamily="34" charset="0"/>
+              <a:buChar char="•"/>
+              <a:defRPr sz="1800" kern="1200">
+                <a:solidFill>
+                  <a:schemeClr val="tx1"/>
+                </a:solidFill>
+                <a:latin typeface="+mn-lt"/>
+                <a:ea typeface="+mn-ea"/>
+                <a:cs typeface="+mn-cs"/>
+              </a:defRPr>
+            </a:lvl5pPr>
+            <a:lvl6pPr marL="2514600" indent="-228600" algn="l" defTabSz="914400" rtl="0" eaLnBrk="1" latinLnBrk="0" hangingPunct="1">
+              <a:lnSpc>
+                <a:spcPct val="90000"/>
+              </a:lnSpc>
+              <a:spcBef>
+                <a:spcPts val="500"/>
+              </a:spcBef>
+              <a:buFont typeface="Arial" panose="020B0604020202020204" pitchFamily="34" charset="0"/>
+              <a:buChar char="•"/>
+              <a:defRPr sz="1800" kern="1200">
+                <a:solidFill>
+                  <a:schemeClr val="tx1"/>
+                </a:solidFill>
+                <a:latin typeface="+mn-lt"/>
+                <a:ea typeface="+mn-ea"/>
+                <a:cs typeface="+mn-cs"/>
+              </a:defRPr>
+            </a:lvl6pPr>
+            <a:lvl7pPr marL="2971800" indent="-228600" algn="l" defTabSz="914400" rtl="0" eaLnBrk="1" latinLnBrk="0" hangingPunct="1">
+              <a:lnSpc>
+                <a:spcPct val="90000"/>
+              </a:lnSpc>
+              <a:spcBef>
+                <a:spcPts val="500"/>
+              </a:spcBef>
+              <a:buFont typeface="Arial" panose="020B0604020202020204" pitchFamily="34" charset="0"/>
+              <a:buChar char="•"/>
+              <a:defRPr sz="1800" kern="1200">
+                <a:solidFill>
+                  <a:schemeClr val="tx1"/>
+                </a:solidFill>
+                <a:latin typeface="+mn-lt"/>
+                <a:ea typeface="+mn-ea"/>
+                <a:cs typeface="+mn-cs"/>
+              </a:defRPr>
+            </a:lvl7pPr>
+            <a:lvl8pPr marL="3429000" indent="-228600" algn="l" defTabSz="914400" rtl="0" eaLnBrk="1" latinLnBrk="0" hangingPunct="1">
+              <a:lnSpc>
+                <a:spcPct val="90000"/>
+              </a:lnSpc>
+              <a:spcBef>
+                <a:spcPts val="500"/>
+              </a:spcBef>
+              <a:buFont typeface="Arial" panose="020B0604020202020204" pitchFamily="34" charset="0"/>
+              <a:buChar char="•"/>
+              <a:defRPr sz="1800" kern="1200">
+                <a:solidFill>
+                  <a:schemeClr val="tx1"/>
+                </a:solidFill>
+                <a:latin typeface="+mn-lt"/>
+                <a:ea typeface="+mn-ea"/>
+                <a:cs typeface="+mn-cs"/>
+              </a:defRPr>
+            </a:lvl8pPr>
+            <a:lvl9pPr marL="3886200" indent="-228600" algn="l" defTabSz="914400" rtl="0" eaLnBrk="1" latinLnBrk="0" hangingPunct="1">
+              <a:lnSpc>
+                <a:spcPct val="90000"/>
+              </a:lnSpc>
+              <a:spcBef>
+                <a:spcPts val="500"/>
+              </a:spcBef>
+              <a:buFont typeface="Arial" panose="020B0604020202020204" pitchFamily="34" charset="0"/>
+              <a:buChar char="•"/>
+              <a:defRPr sz="1800" kern="1200">
+                <a:solidFill>
+                  <a:schemeClr val="tx1"/>
+                </a:solidFill>
+                <a:latin typeface="+mn-lt"/>
+                <a:ea typeface="+mn-ea"/>
+                <a:cs typeface="+mn-cs"/>
+              </a:defRPr>
+            </a:lvl9pPr>
+          </a:lstStyle>
+          <a:p>
+            <a:pPr marL="0" indent="0">
+              <a:buFont typeface="Arial" panose="020B0604020202020204" pitchFamily="34" charset="0"/>
+              <a:buNone/>
+            </a:pPr>
+            <a:r>
+              <a:rPr lang="en-US" sz="2400" dirty="0"/>
+              <a:t>Digit Recognition: Supervised or Unsupervised?</a:t>
+            </a:r>
+          </a:p>
+        </p:txBody>
+      </p:sp>
+      <p:sp>
+        <p:nvSpPr>
+          <p:cNvPr id="6" name="Content Placeholder 2">
+            <a:extLst>
+              <a:ext uri="{FF2B5EF4-FFF2-40B4-BE49-F238E27FC236}">
+                <a16:creationId xmlns:a16="http://schemas.microsoft.com/office/drawing/2014/main" id="{CF2804CB-9F49-0B41-80CA-6D5AC7D95B56}"/>
+              </a:ext>
+            </a:extLst>
+          </p:cNvPr>
+          <p:cNvSpPr txBox="1">
+            <a:spLocks/>
+          </p:cNvSpPr>
+          <p:nvPr/>
+        </p:nvSpPr>
+        <p:spPr>
+          <a:xfrm>
+            <a:off x="975360" y="3696801"/>
+            <a:ext cx="9616440" cy="852100"/>
+          </a:xfrm>
+          <a:prstGeom prst="rect">
+            <a:avLst/>
+          </a:prstGeom>
+        </p:spPr>
+        <p:txBody>
+          <a:bodyPr vert="horz" lIns="91440" tIns="45720" rIns="91440" bIns="45720" rtlCol="0">
+            <a:normAutofit/>
+          </a:bodyPr>
+          <a:lstStyle>
+            <a:lvl1pPr marL="228600" indent="-228600" algn="l" defTabSz="914400" rtl="0" eaLnBrk="1" latinLnBrk="0" hangingPunct="1">
+              <a:lnSpc>
+                <a:spcPct val="90000"/>
+              </a:lnSpc>
+              <a:spcBef>
+                <a:spcPts val="1000"/>
+              </a:spcBef>
+              <a:buFont typeface="Arial" panose="020B0604020202020204" pitchFamily="34" charset="0"/>
+              <a:buChar char="•"/>
+              <a:defRPr sz="2800" kern="1200">
+                <a:solidFill>
+                  <a:schemeClr val="tx1"/>
+                </a:solidFill>
+                <a:latin typeface="+mn-lt"/>
+                <a:ea typeface="+mn-ea"/>
+                <a:cs typeface="+mn-cs"/>
+              </a:defRPr>
+            </a:lvl1pPr>
+            <a:lvl2pPr marL="685800" indent="-228600" algn="l" defTabSz="914400" rtl="0" eaLnBrk="1" latinLnBrk="0" hangingPunct="1">
+              <a:lnSpc>
+                <a:spcPct val="90000"/>
+              </a:lnSpc>
+              <a:spcBef>
+                <a:spcPts val="500"/>
+              </a:spcBef>
+              <a:buFont typeface="Arial" panose="020B0604020202020204" pitchFamily="34" charset="0"/>
+              <a:buChar char="•"/>
+              <a:defRPr sz="2400" kern="1200">
+                <a:solidFill>
+                  <a:schemeClr val="tx1"/>
+                </a:solidFill>
+                <a:latin typeface="+mn-lt"/>
+                <a:ea typeface="+mn-ea"/>
+                <a:cs typeface="+mn-cs"/>
+              </a:defRPr>
+            </a:lvl2pPr>
+            <a:lvl3pPr marL="1143000" indent="-228600" algn="l" defTabSz="914400" rtl="0" eaLnBrk="1" latinLnBrk="0" hangingPunct="1">
+              <a:lnSpc>
+                <a:spcPct val="90000"/>
+              </a:lnSpc>
+              <a:spcBef>
+                <a:spcPts val="500"/>
+              </a:spcBef>
+              <a:buFont typeface="Arial" panose="020B0604020202020204" pitchFamily="34" charset="0"/>
+              <a:buChar char="•"/>
+              <a:defRPr sz="2000" kern="1200">
+                <a:solidFill>
+                  <a:schemeClr val="tx1"/>
+                </a:solidFill>
+                <a:latin typeface="+mn-lt"/>
+                <a:ea typeface="+mn-ea"/>
+                <a:cs typeface="+mn-cs"/>
+              </a:defRPr>
+            </a:lvl3pPr>
+            <a:lvl4pPr marL="1600200" indent="-228600" algn="l" defTabSz="914400" rtl="0" eaLnBrk="1" latinLnBrk="0" hangingPunct="1">
+              <a:lnSpc>
+                <a:spcPct val="90000"/>
+              </a:lnSpc>
+              <a:spcBef>
+                <a:spcPts val="500"/>
+              </a:spcBef>
+              <a:buFont typeface="Arial" panose="020B0604020202020204" pitchFamily="34" charset="0"/>
+              <a:buChar char="•"/>
+              <a:defRPr sz="1800" kern="1200">
+                <a:solidFill>
+                  <a:schemeClr val="tx1"/>
+                </a:solidFill>
+                <a:latin typeface="+mn-lt"/>
+                <a:ea typeface="+mn-ea"/>
+                <a:cs typeface="+mn-cs"/>
+              </a:defRPr>
+            </a:lvl4pPr>
+            <a:lvl5pPr marL="2057400" indent="-228600" algn="l" defTabSz="914400" rtl="0" eaLnBrk="1" latinLnBrk="0" hangingPunct="1">
+              <a:lnSpc>
+                <a:spcPct val="90000"/>
+              </a:lnSpc>
+              <a:spcBef>
+                <a:spcPts val="500"/>
+              </a:spcBef>
+              <a:buFont typeface="Arial" panose="020B0604020202020204" pitchFamily="34" charset="0"/>
+              <a:buChar char="•"/>
+              <a:defRPr sz="1800" kern="1200">
+                <a:solidFill>
+                  <a:schemeClr val="tx1"/>
+                </a:solidFill>
+                <a:latin typeface="+mn-lt"/>
+                <a:ea typeface="+mn-ea"/>
+                <a:cs typeface="+mn-cs"/>
+              </a:defRPr>
+            </a:lvl5pPr>
+            <a:lvl6pPr marL="2514600" indent="-228600" algn="l" defTabSz="914400" rtl="0" eaLnBrk="1" latinLnBrk="0" hangingPunct="1">
+              <a:lnSpc>
+                <a:spcPct val="90000"/>
+              </a:lnSpc>
+              <a:spcBef>
+                <a:spcPts val="500"/>
+              </a:spcBef>
+              <a:buFont typeface="Arial" panose="020B0604020202020204" pitchFamily="34" charset="0"/>
+              <a:buChar char="•"/>
+              <a:defRPr sz="1800" kern="1200">
+                <a:solidFill>
+                  <a:schemeClr val="tx1"/>
+                </a:solidFill>
+                <a:latin typeface="+mn-lt"/>
+                <a:ea typeface="+mn-ea"/>
+                <a:cs typeface="+mn-cs"/>
+              </a:defRPr>
+            </a:lvl6pPr>
+            <a:lvl7pPr marL="2971800" indent="-228600" algn="l" defTabSz="914400" rtl="0" eaLnBrk="1" latinLnBrk="0" hangingPunct="1">
+              <a:lnSpc>
+                <a:spcPct val="90000"/>
+              </a:lnSpc>
+              <a:spcBef>
+                <a:spcPts val="500"/>
+              </a:spcBef>
+              <a:buFont typeface="Arial" panose="020B0604020202020204" pitchFamily="34" charset="0"/>
+              <a:buChar char="•"/>
+              <a:defRPr sz="1800" kern="1200">
+                <a:solidFill>
+                  <a:schemeClr val="tx1"/>
+                </a:solidFill>
+                <a:latin typeface="+mn-lt"/>
+                <a:ea typeface="+mn-ea"/>
+                <a:cs typeface="+mn-cs"/>
+              </a:defRPr>
+            </a:lvl7pPr>
+            <a:lvl8pPr marL="3429000" indent="-228600" algn="l" defTabSz="914400" rtl="0" eaLnBrk="1" latinLnBrk="0" hangingPunct="1">
+              <a:lnSpc>
+                <a:spcPct val="90000"/>
+              </a:lnSpc>
+              <a:spcBef>
+                <a:spcPts val="500"/>
+              </a:spcBef>
+              <a:buFont typeface="Arial" panose="020B0604020202020204" pitchFamily="34" charset="0"/>
+              <a:buChar char="•"/>
+              <a:defRPr sz="1800" kern="1200">
+                <a:solidFill>
+                  <a:schemeClr val="tx1"/>
+                </a:solidFill>
+                <a:latin typeface="+mn-lt"/>
+                <a:ea typeface="+mn-ea"/>
+                <a:cs typeface="+mn-cs"/>
+              </a:defRPr>
+            </a:lvl8pPr>
+            <a:lvl9pPr marL="3886200" indent="-228600" algn="l" defTabSz="914400" rtl="0" eaLnBrk="1" latinLnBrk="0" hangingPunct="1">
+              <a:lnSpc>
+                <a:spcPct val="90000"/>
+              </a:lnSpc>
+              <a:spcBef>
+                <a:spcPts val="500"/>
+              </a:spcBef>
+              <a:buFont typeface="Arial" panose="020B0604020202020204" pitchFamily="34" charset="0"/>
+              <a:buChar char="•"/>
+              <a:defRPr sz="1800" kern="1200">
+                <a:solidFill>
+                  <a:schemeClr val="tx1"/>
+                </a:solidFill>
+                <a:latin typeface="+mn-lt"/>
+                <a:ea typeface="+mn-ea"/>
+                <a:cs typeface="+mn-cs"/>
+              </a:defRPr>
+            </a:lvl9pPr>
+          </a:lstStyle>
+          <a:p>
+            <a:pPr marL="0" indent="0">
+              <a:buFont typeface="Arial" panose="020B0604020202020204" pitchFamily="34" charset="0"/>
+              <a:buNone/>
+            </a:pPr>
+            <a:r>
+              <a:rPr lang="en-US" sz="2400" dirty="0"/>
+              <a:t>Generative Models: Supervised or Unsupervised?</a:t>
+            </a:r>
+          </a:p>
+        </p:txBody>
+      </p:sp>
+      <p:sp>
+        <p:nvSpPr>
+          <p:cNvPr id="7" name="Content Placeholder 2">
+            <a:extLst>
+              <a:ext uri="{FF2B5EF4-FFF2-40B4-BE49-F238E27FC236}">
+                <a16:creationId xmlns:a16="http://schemas.microsoft.com/office/drawing/2014/main" id="{EF07AF62-A0D6-C84A-A2F8-697E31157070}"/>
+              </a:ext>
+            </a:extLst>
+          </p:cNvPr>
+          <p:cNvSpPr txBox="1">
+            <a:spLocks/>
+          </p:cNvSpPr>
+          <p:nvPr/>
+        </p:nvSpPr>
+        <p:spPr>
+          <a:xfrm>
+            <a:off x="975360" y="4548901"/>
+            <a:ext cx="9616440" cy="852100"/>
+          </a:xfrm>
+          <a:prstGeom prst="rect">
+            <a:avLst/>
+          </a:prstGeom>
+        </p:spPr>
+        <p:txBody>
+          <a:bodyPr vert="horz" lIns="91440" tIns="45720" rIns="91440" bIns="45720" rtlCol="0">
+            <a:normAutofit/>
+          </a:bodyPr>
+          <a:lstStyle>
+            <a:lvl1pPr marL="228600" indent="-228600" algn="l" defTabSz="914400" rtl="0" eaLnBrk="1" latinLnBrk="0" hangingPunct="1">
+              <a:lnSpc>
+                <a:spcPct val="90000"/>
+              </a:lnSpc>
+              <a:spcBef>
+                <a:spcPts val="1000"/>
+              </a:spcBef>
+              <a:buFont typeface="Arial" panose="020B0604020202020204" pitchFamily="34" charset="0"/>
+              <a:buChar char="•"/>
+              <a:defRPr sz="2800" kern="1200">
+                <a:solidFill>
+                  <a:schemeClr val="tx1"/>
+                </a:solidFill>
+                <a:latin typeface="+mn-lt"/>
+                <a:ea typeface="+mn-ea"/>
+                <a:cs typeface="+mn-cs"/>
+              </a:defRPr>
+            </a:lvl1pPr>
+            <a:lvl2pPr marL="685800" indent="-228600" algn="l" defTabSz="914400" rtl="0" eaLnBrk="1" latinLnBrk="0" hangingPunct="1">
+              <a:lnSpc>
+                <a:spcPct val="90000"/>
+              </a:lnSpc>
+              <a:spcBef>
+                <a:spcPts val="500"/>
+              </a:spcBef>
+              <a:buFont typeface="Arial" panose="020B0604020202020204" pitchFamily="34" charset="0"/>
+              <a:buChar char="•"/>
+              <a:defRPr sz="2400" kern="1200">
+                <a:solidFill>
+                  <a:schemeClr val="tx1"/>
+                </a:solidFill>
+                <a:latin typeface="+mn-lt"/>
+                <a:ea typeface="+mn-ea"/>
+                <a:cs typeface="+mn-cs"/>
+              </a:defRPr>
+            </a:lvl2pPr>
+            <a:lvl3pPr marL="1143000" indent="-228600" algn="l" defTabSz="914400" rtl="0" eaLnBrk="1" latinLnBrk="0" hangingPunct="1">
+              <a:lnSpc>
+                <a:spcPct val="90000"/>
+              </a:lnSpc>
+              <a:spcBef>
+                <a:spcPts val="500"/>
+              </a:spcBef>
+              <a:buFont typeface="Arial" panose="020B0604020202020204" pitchFamily="34" charset="0"/>
+              <a:buChar char="•"/>
+              <a:defRPr sz="2000" kern="1200">
+                <a:solidFill>
+                  <a:schemeClr val="tx1"/>
+                </a:solidFill>
+                <a:latin typeface="+mn-lt"/>
+                <a:ea typeface="+mn-ea"/>
+                <a:cs typeface="+mn-cs"/>
+              </a:defRPr>
+            </a:lvl3pPr>
+            <a:lvl4pPr marL="1600200" indent="-228600" algn="l" defTabSz="914400" rtl="0" eaLnBrk="1" latinLnBrk="0" hangingPunct="1">
+              <a:lnSpc>
+                <a:spcPct val="90000"/>
+              </a:lnSpc>
+              <a:spcBef>
+                <a:spcPts val="500"/>
+              </a:spcBef>
+              <a:buFont typeface="Arial" panose="020B0604020202020204" pitchFamily="34" charset="0"/>
+              <a:buChar char="•"/>
+              <a:defRPr sz="1800" kern="1200">
+                <a:solidFill>
+                  <a:schemeClr val="tx1"/>
+                </a:solidFill>
+                <a:latin typeface="+mn-lt"/>
+                <a:ea typeface="+mn-ea"/>
+                <a:cs typeface="+mn-cs"/>
+              </a:defRPr>
+            </a:lvl4pPr>
+            <a:lvl5pPr marL="2057400" indent="-228600" algn="l" defTabSz="914400" rtl="0" eaLnBrk="1" latinLnBrk="0" hangingPunct="1">
+              <a:lnSpc>
+                <a:spcPct val="90000"/>
+              </a:lnSpc>
+              <a:spcBef>
+                <a:spcPts val="500"/>
+              </a:spcBef>
+              <a:buFont typeface="Arial" panose="020B0604020202020204" pitchFamily="34" charset="0"/>
+              <a:buChar char="•"/>
+              <a:defRPr sz="1800" kern="1200">
+                <a:solidFill>
+                  <a:schemeClr val="tx1"/>
+                </a:solidFill>
+                <a:latin typeface="+mn-lt"/>
+                <a:ea typeface="+mn-ea"/>
+                <a:cs typeface="+mn-cs"/>
+              </a:defRPr>
+            </a:lvl5pPr>
+            <a:lvl6pPr marL="2514600" indent="-228600" algn="l" defTabSz="914400" rtl="0" eaLnBrk="1" latinLnBrk="0" hangingPunct="1">
+              <a:lnSpc>
+                <a:spcPct val="90000"/>
+              </a:lnSpc>
+              <a:spcBef>
+                <a:spcPts val="500"/>
+              </a:spcBef>
+              <a:buFont typeface="Arial" panose="020B0604020202020204" pitchFamily="34" charset="0"/>
+              <a:buChar char="•"/>
+              <a:defRPr sz="1800" kern="1200">
+                <a:solidFill>
+                  <a:schemeClr val="tx1"/>
+                </a:solidFill>
+                <a:latin typeface="+mn-lt"/>
+                <a:ea typeface="+mn-ea"/>
+                <a:cs typeface="+mn-cs"/>
+              </a:defRPr>
+            </a:lvl6pPr>
+            <a:lvl7pPr marL="2971800" indent="-228600" algn="l" defTabSz="914400" rtl="0" eaLnBrk="1" latinLnBrk="0" hangingPunct="1">
+              <a:lnSpc>
+                <a:spcPct val="90000"/>
+              </a:lnSpc>
+              <a:spcBef>
+                <a:spcPts val="500"/>
+              </a:spcBef>
+              <a:buFont typeface="Arial" panose="020B0604020202020204" pitchFamily="34" charset="0"/>
+              <a:buChar char="•"/>
+              <a:defRPr sz="1800" kern="1200">
+                <a:solidFill>
+                  <a:schemeClr val="tx1"/>
+                </a:solidFill>
+                <a:latin typeface="+mn-lt"/>
+                <a:ea typeface="+mn-ea"/>
+                <a:cs typeface="+mn-cs"/>
+              </a:defRPr>
+            </a:lvl7pPr>
+            <a:lvl8pPr marL="3429000" indent="-228600" algn="l" defTabSz="914400" rtl="0" eaLnBrk="1" latinLnBrk="0" hangingPunct="1">
+              <a:lnSpc>
+                <a:spcPct val="90000"/>
+              </a:lnSpc>
+              <a:spcBef>
+                <a:spcPts val="500"/>
+              </a:spcBef>
+              <a:buFont typeface="Arial" panose="020B0604020202020204" pitchFamily="34" charset="0"/>
+              <a:buChar char="•"/>
+              <a:defRPr sz="1800" kern="1200">
+                <a:solidFill>
+                  <a:schemeClr val="tx1"/>
+                </a:solidFill>
+                <a:latin typeface="+mn-lt"/>
+                <a:ea typeface="+mn-ea"/>
+                <a:cs typeface="+mn-cs"/>
+              </a:defRPr>
+            </a:lvl8pPr>
+            <a:lvl9pPr marL="3886200" indent="-228600" algn="l" defTabSz="914400" rtl="0" eaLnBrk="1" latinLnBrk="0" hangingPunct="1">
+              <a:lnSpc>
+                <a:spcPct val="90000"/>
+              </a:lnSpc>
+              <a:spcBef>
+                <a:spcPts val="500"/>
+              </a:spcBef>
+              <a:buFont typeface="Arial" panose="020B0604020202020204" pitchFamily="34" charset="0"/>
+              <a:buChar char="•"/>
+              <a:defRPr sz="1800" kern="1200">
+                <a:solidFill>
+                  <a:schemeClr val="tx1"/>
+                </a:solidFill>
+                <a:latin typeface="+mn-lt"/>
+                <a:ea typeface="+mn-ea"/>
+                <a:cs typeface="+mn-cs"/>
+              </a:defRPr>
+            </a:lvl9pPr>
+          </a:lstStyle>
+          <a:p>
+            <a:pPr marL="0" indent="0">
+              <a:buFont typeface="Arial" panose="020B0604020202020204" pitchFamily="34" charset="0"/>
+              <a:buNone/>
+            </a:pPr>
+            <a:r>
+              <a:rPr lang="en-US" sz="2400" dirty="0"/>
+              <a:t>Text-to-Image Generation: Supervised or Unsupervised?</a:t>
+            </a:r>
+          </a:p>
+        </p:txBody>
+      </p:sp>
+    </p:spTree>
+    <p:extLst>
+      <p:ext uri="{BB962C8B-B14F-4D97-AF65-F5344CB8AC3E}">
+        <p14:creationId xmlns:p14="http://schemas.microsoft.com/office/powerpoint/2010/main" val="2487663333"/>
+      </p:ext>
+    </p:extLst>
+  </p:cSld>
+  <p:clrMapOvr>
+    <a:masterClrMapping/>
+  </p:clrMapOvr>
+</p:sld>
+</file>
+
+<file path=ppt/slides/slide18.xml><?xml version="1.0" encoding="utf-8"?>
 <p:sld xmlns:a="http://schemas.openxmlformats.org/drawingml/2006/main" xmlns:r="http://schemas.openxmlformats.org/officeDocument/2006/relationships" xmlns:p="http://schemas.openxmlformats.org/presentationml/2006/main">
   <p:cSld>
     <p:spTree>
@@ -5684,7 +7453,7 @@
 </p:sld>
 </file>
 
-<file path=ppt/slides/slide14.xml><?xml version="1.0" encoding="utf-8"?>
+<file path=ppt/slides/slide19.xml><?xml version="1.0" encoding="utf-8"?>
 <p:sld xmlns:a="http://schemas.openxmlformats.org/drawingml/2006/main" xmlns:r="http://schemas.openxmlformats.org/officeDocument/2006/relationships" xmlns:p="http://schemas.openxmlformats.org/presentationml/2006/main">
   <p:cSld>
     <p:spTree>
@@ -5701,40 +7470,9 @@
           <a:chExt cx="0" cy="0"/>
         </a:xfrm>
       </p:grpSpPr>
-      <p:sp>
-        <p:nvSpPr>
-          <p:cNvPr id="2" name="Title 1"/>
-          <p:cNvSpPr>
-            <a:spLocks noGrp="1"/>
-          </p:cNvSpPr>
-          <p:nvPr>
-            <p:ph type="title"/>
-          </p:nvPr>
-        </p:nvSpPr>
-        <p:spPr>
-          <a:xfrm>
-            <a:off x="838200" y="-35707"/>
-            <a:ext cx="10515600" cy="1325563"/>
-          </a:xfrm>
-        </p:spPr>
-        <p:txBody>
-          <a:bodyPr/>
-          <a:lstStyle/>
-          <a:p>
-            <a:r>
-              <a:rPr lang="en-US" dirty="0">
-                <a:solidFill>
-                  <a:srgbClr val="0070C0"/>
-                </a:solidFill>
-              </a:rPr>
-              <a:t>Tools</a:t>
-            </a:r>
-          </a:p>
-        </p:txBody>
-      </p:sp>
       <p:pic>
         <p:nvPicPr>
-          <p:cNvPr id="14" name="Picture 4" descr="File:UMKC logo.png - Wikipedia"/>
+          <p:cNvPr id="1026" name="Picture 2" descr="Python (programming language) - Wikipedia"/>
           <p:cNvPicPr>
             <a:picLocks noChangeAspect="1" noChangeArrowheads="1"/>
           </p:cNvPicPr>
@@ -5755,8 +7493,8 @@
         </p:blipFill>
         <p:spPr bwMode="auto">
           <a:xfrm>
-            <a:off x="10741981" y="5731992"/>
-            <a:ext cx="1293518" cy="571124"/>
+            <a:off x="9837704" y="2278172"/>
+            <a:ext cx="1409240" cy="1544292"/>
           </a:xfrm>
           <a:prstGeom prst="rect">
             <a:avLst/>
@@ -5775,7 +7513,7 @@
       </p:pic>
       <p:pic>
         <p:nvPicPr>
-          <p:cNvPr id="1026" name="Picture 2" descr="Python (programming language) - Wikipedia"/>
+          <p:cNvPr id="1028" name="Picture 4" descr="The Ultimate Guide to the NumPy Package for Scientific Computing in Python"/>
           <p:cNvPicPr>
             <a:picLocks noChangeAspect="1" noChangeArrowheads="1"/>
           </p:cNvPicPr>
@@ -5796,8 +7534,8 @@
         </p:blipFill>
         <p:spPr bwMode="auto">
           <a:xfrm>
-            <a:off x="1129945" y="1363543"/>
-            <a:ext cx="1409240" cy="1544292"/>
+            <a:off x="838200" y="2082336"/>
+            <a:ext cx="3031934" cy="1200140"/>
           </a:xfrm>
           <a:prstGeom prst="rect">
             <a:avLst/>
@@ -5816,7 +7554,7 @@
       </p:pic>
       <p:pic>
         <p:nvPicPr>
-          <p:cNvPr id="1028" name="Picture 4" descr="The Ultimate Guide to the NumPy Package for Scientific Computing in Python"/>
+          <p:cNvPr id="1030" name="Picture 6" descr="pandas (software) - Wikipedia"/>
           <p:cNvPicPr>
             <a:picLocks noChangeAspect="1" noChangeArrowheads="1"/>
           </p:cNvPicPr>
@@ -5837,48 +7575,7 @@
         </p:blipFill>
         <p:spPr bwMode="auto">
           <a:xfrm>
-            <a:off x="3760122" y="1450811"/>
-            <a:ext cx="3031934" cy="1200140"/>
-          </a:xfrm>
-          <a:prstGeom prst="rect">
-            <a:avLst/>
-          </a:prstGeom>
-          <a:noFill/>
-          <a:extLst>
-            <a:ext uri="{909E8E84-426E-40DD-AFC4-6F175D3DCCD1}">
-              <a14:hiddenFill xmlns:a14="http://schemas.microsoft.com/office/drawing/2010/main">
-                <a:solidFill>
-                  <a:srgbClr val="FFFFFF"/>
-                </a:solidFill>
-              </a14:hiddenFill>
-            </a:ext>
-          </a:extLst>
-        </p:spPr>
-      </p:pic>
-      <p:pic>
-        <p:nvPicPr>
-          <p:cNvPr id="1030" name="Picture 6" descr="pandas (software) - Wikipedia"/>
-          <p:cNvPicPr>
-            <a:picLocks noChangeAspect="1" noChangeArrowheads="1"/>
-          </p:cNvPicPr>
-          <p:nvPr/>
-        </p:nvPicPr>
-        <p:blipFill>
-          <a:blip r:embed="rId5" cstate="print">
-            <a:extLst>
-              <a:ext uri="{28A0092B-C50C-407E-A947-70E740481C1C}">
-                <a14:useLocalDpi xmlns:a14="http://schemas.microsoft.com/office/drawing/2010/main" val="0"/>
-              </a:ext>
-            </a:extLst>
-          </a:blip>
-          <a:srcRect/>
-          <a:stretch>
-            <a:fillRect/>
-          </a:stretch>
-        </p:blipFill>
-        <p:spPr bwMode="auto">
-          <a:xfrm>
-            <a:off x="1243938" y="3588147"/>
+            <a:off x="838200" y="4380627"/>
             <a:ext cx="3395041" cy="1372162"/>
           </a:xfrm>
           <a:prstGeom prst="rect">
@@ -5905,7 +7602,7 @@
           <p:nvPr/>
         </p:nvPicPr>
         <p:blipFill>
-          <a:blip r:embed="rId6">
+          <a:blip r:embed="rId5">
             <a:extLst>
               <a:ext uri="{28A0092B-C50C-407E-A947-70E740481C1C}">
                 <a14:useLocalDpi xmlns:a14="http://schemas.microsoft.com/office/drawing/2010/main" val="0"/>
@@ -5919,7 +7616,7 @@
         </p:blipFill>
         <p:spPr bwMode="auto">
           <a:xfrm>
-            <a:off x="5153461" y="3705509"/>
+            <a:off x="4595323" y="2310171"/>
             <a:ext cx="4861523" cy="972305"/>
           </a:xfrm>
           <a:prstGeom prst="rect">
@@ -5940,6 +7637,47 @@
       <p:pic>
         <p:nvPicPr>
           <p:cNvPr id="1038" name="Picture 14" descr="How to Use Mapillary Data in Jupyter Notebooks - The Mapillary Blog"/>
+          <p:cNvPicPr>
+            <a:picLocks noChangeAspect="1" noChangeArrowheads="1"/>
+          </p:cNvPicPr>
+          <p:nvPr/>
+        </p:nvPicPr>
+        <p:blipFill>
+          <a:blip r:embed="rId6" cstate="print">
+            <a:extLst>
+              <a:ext uri="{28A0092B-C50C-407E-A947-70E740481C1C}">
+                <a14:useLocalDpi xmlns:a14="http://schemas.microsoft.com/office/drawing/2010/main" val="0"/>
+              </a:ext>
+            </a:extLst>
+          </a:blip>
+          <a:srcRect/>
+          <a:stretch>
+            <a:fillRect/>
+          </a:stretch>
+        </p:blipFill>
+        <p:spPr bwMode="auto">
+          <a:xfrm>
+            <a:off x="7736337" y="4423523"/>
+            <a:ext cx="3716827" cy="1002741"/>
+          </a:xfrm>
+          <a:prstGeom prst="rect">
+            <a:avLst/>
+          </a:prstGeom>
+          <a:noFill/>
+          <a:extLst>
+            <a:ext uri="{909E8E84-426E-40DD-AFC4-6F175D3DCCD1}">
+              <a14:hiddenFill xmlns:a14="http://schemas.microsoft.com/office/drawing/2010/main">
+                <a:solidFill>
+                  <a:srgbClr val="FFFFFF"/>
+                </a:solidFill>
+              </a14:hiddenFill>
+            </a:ext>
+          </a:extLst>
+        </p:spPr>
+      </p:pic>
+      <p:pic>
+        <p:nvPicPr>
+          <p:cNvPr id="1040" name="Picture 16" descr="File:Scikit learn logo small.svg - Wikimedia Commons"/>
           <p:cNvPicPr>
             <a:picLocks noChangeAspect="1" noChangeArrowheads="1"/>
           </p:cNvPicPr>
@@ -5960,48 +7698,7 @@
         </p:blipFill>
         <p:spPr bwMode="auto">
           <a:xfrm>
-            <a:off x="1427967" y="5486401"/>
-            <a:ext cx="3716827" cy="1002741"/>
-          </a:xfrm>
-          <a:prstGeom prst="rect">
-            <a:avLst/>
-          </a:prstGeom>
-          <a:noFill/>
-          <a:extLst>
-            <a:ext uri="{909E8E84-426E-40DD-AFC4-6F175D3DCCD1}">
-              <a14:hiddenFill xmlns:a14="http://schemas.microsoft.com/office/drawing/2010/main">
-                <a:solidFill>
-                  <a:srgbClr val="FFFFFF"/>
-                </a:solidFill>
-              </a14:hiddenFill>
-            </a:ext>
-          </a:extLst>
-        </p:spPr>
-      </p:pic>
-      <p:pic>
-        <p:nvPicPr>
-          <p:cNvPr id="1040" name="Picture 16" descr="File:Scikit learn logo small.svg - Wikimedia Commons"/>
-          <p:cNvPicPr>
-            <a:picLocks noChangeAspect="1" noChangeArrowheads="1"/>
-          </p:cNvPicPr>
-          <p:nvPr/>
-        </p:nvPicPr>
-        <p:blipFill>
-          <a:blip r:embed="rId8" cstate="print">
-            <a:extLst>
-              <a:ext uri="{28A0092B-C50C-407E-A947-70E740481C1C}">
-                <a14:useLocalDpi xmlns:a14="http://schemas.microsoft.com/office/drawing/2010/main" val="0"/>
-              </a:ext>
-            </a:extLst>
-          </a:blip>
-          <a:srcRect/>
-          <a:stretch>
-            <a:fillRect/>
-          </a:stretch>
-        </p:blipFill>
-        <p:spPr bwMode="auto">
-          <a:xfrm>
-            <a:off x="7639469" y="1210016"/>
+            <a:off x="4595323" y="4018300"/>
             <a:ext cx="2664944" cy="1434490"/>
           </a:xfrm>
           <a:prstGeom prst="rect">
@@ -6019,6 +7716,60 @@
           </a:extLst>
         </p:spPr>
       </p:pic>
+      <p:sp>
+        <p:nvSpPr>
+          <p:cNvPr id="12" name="Title 1">
+            <a:extLst>
+              <a:ext uri="{FF2B5EF4-FFF2-40B4-BE49-F238E27FC236}">
+                <a16:creationId xmlns:a16="http://schemas.microsoft.com/office/drawing/2014/main" id="{60BF935A-CCAC-124B-810D-8F2B4E96E7E3}"/>
+              </a:ext>
+            </a:extLst>
+          </p:cNvPr>
+          <p:cNvSpPr txBox="1">
+            <a:spLocks/>
+          </p:cNvSpPr>
+          <p:nvPr/>
+        </p:nvSpPr>
+        <p:spPr>
+          <a:xfrm>
+            <a:off x="838200" y="365126"/>
+            <a:ext cx="10515600" cy="981894"/>
+          </a:xfrm>
+          <a:prstGeom prst="rect">
+            <a:avLst/>
+          </a:prstGeom>
+        </p:spPr>
+        <p:txBody>
+          <a:bodyPr vert="horz" lIns="91440" tIns="45720" rIns="91440" bIns="45720" rtlCol="0" anchor="ctr">
+            <a:normAutofit/>
+          </a:bodyPr>
+          <a:lstStyle>
+            <a:lvl1pPr algn="l" defTabSz="914400" rtl="0" eaLnBrk="1" latinLnBrk="0" hangingPunct="1">
+              <a:lnSpc>
+                <a:spcPct val="90000"/>
+              </a:lnSpc>
+              <a:spcBef>
+                <a:spcPct val="0"/>
+              </a:spcBef>
+              <a:buNone/>
+              <a:defRPr sz="4400" kern="1200">
+                <a:solidFill>
+                  <a:schemeClr val="tx1"/>
+                </a:solidFill>
+                <a:latin typeface="+mj-lt"/>
+                <a:ea typeface="+mj-ea"/>
+                <a:cs typeface="+mj-cs"/>
+              </a:defRPr>
+            </a:lvl1pPr>
+          </a:lstStyle>
+          <a:p>
+            <a:r>
+              <a:rPr lang="en-US" dirty="0"/>
+              <a:t>Implementation Tools</a:t>
+            </a:r>
+          </a:p>
+        </p:txBody>
+      </p:sp>
     </p:spTree>
     <p:extLst>
       <p:ext uri="{BB962C8B-B14F-4D97-AF65-F5344CB8AC3E}">
@@ -6032,7 +7783,376 @@
 </p:sld>
 </file>
 
-<file path=ppt/slides/slide15.xml><?xml version="1.0" encoding="utf-8"?>
+<file path=ppt/slides/slide2.xml><?xml version="1.0" encoding="utf-8"?>
+<p:sld xmlns:a="http://schemas.openxmlformats.org/drawingml/2006/main" xmlns:r="http://schemas.openxmlformats.org/officeDocument/2006/relationships" xmlns:p="http://schemas.openxmlformats.org/presentationml/2006/main">
+  <p:cSld>
+    <p:spTree>
+      <p:nvGrpSpPr>
+        <p:cNvPr id="1" name=""/>
+        <p:cNvGrpSpPr/>
+        <p:nvPr/>
+      </p:nvGrpSpPr>
+      <p:grpSpPr>
+        <a:xfrm>
+          <a:off x="0" y="0"/>
+          <a:ext cx="0" cy="0"/>
+          <a:chOff x="0" y="0"/>
+          <a:chExt cx="0" cy="0"/>
+        </a:xfrm>
+      </p:grpSpPr>
+      <p:sp>
+        <p:nvSpPr>
+          <p:cNvPr id="2" name="Title 1">
+            <a:extLst>
+              <a:ext uri="{FF2B5EF4-FFF2-40B4-BE49-F238E27FC236}">
+                <a16:creationId xmlns:a16="http://schemas.microsoft.com/office/drawing/2014/main" id="{87BF30BF-7806-D247-A2AF-B1239989AB83}"/>
+              </a:ext>
+            </a:extLst>
+          </p:cNvPr>
+          <p:cNvSpPr>
+            <a:spLocks noGrp="1"/>
+          </p:cNvSpPr>
+          <p:nvPr>
+            <p:ph type="title"/>
+          </p:nvPr>
+        </p:nvSpPr>
+        <p:spPr/>
+        <p:txBody>
+          <a:bodyPr/>
+          <a:lstStyle/>
+          <a:p>
+            <a:r>
+              <a:rPr lang="en-US" dirty="0"/>
+              <a:t>Course Website</a:t>
+            </a:r>
+          </a:p>
+        </p:txBody>
+      </p:sp>
+      <p:sp>
+        <p:nvSpPr>
+          <p:cNvPr id="7" name="TextBox 6">
+            <a:extLst>
+              <a:ext uri="{FF2B5EF4-FFF2-40B4-BE49-F238E27FC236}">
+                <a16:creationId xmlns:a16="http://schemas.microsoft.com/office/drawing/2014/main" id="{BC953F59-DB65-0241-829C-F5150AEE3958}"/>
+              </a:ext>
+            </a:extLst>
+          </p:cNvPr>
+          <p:cNvSpPr txBox="1"/>
+          <p:nvPr/>
+        </p:nvSpPr>
+        <p:spPr>
+          <a:xfrm>
+            <a:off x="838200" y="1825675"/>
+            <a:ext cx="9159240" cy="461665"/>
+          </a:xfrm>
+          <a:prstGeom prst="rect">
+            <a:avLst/>
+          </a:prstGeom>
+          <a:noFill/>
+        </p:spPr>
+        <p:txBody>
+          <a:bodyPr wrap="square">
+            <a:spAutoFit/>
+          </a:bodyPr>
+          <a:lstStyle/>
+          <a:p>
+            <a:r>
+              <a:rPr lang="en-US" sz="2400" dirty="0"/>
+              <a:t>https://tianzheng4.github.io/</a:t>
+            </a:r>
+            <a:r>
+              <a:rPr lang="en-US" sz="2400" dirty="0" err="1"/>
+              <a:t>umkc</a:t>
+            </a:r>
+            <a:r>
+              <a:rPr lang="en-US" sz="2400" dirty="0"/>
+              <a:t>-teaching/2023-fall-teaching-1/</a:t>
+            </a:r>
+          </a:p>
+        </p:txBody>
+      </p:sp>
+      <p:sp>
+        <p:nvSpPr>
+          <p:cNvPr id="8" name="Content Placeholder 2">
+            <a:extLst>
+              <a:ext uri="{FF2B5EF4-FFF2-40B4-BE49-F238E27FC236}">
+                <a16:creationId xmlns:a16="http://schemas.microsoft.com/office/drawing/2014/main" id="{A699D753-1647-664C-A454-6CD0016A3B91}"/>
+              </a:ext>
+            </a:extLst>
+          </p:cNvPr>
+          <p:cNvSpPr>
+            <a:spLocks noGrp="1"/>
+          </p:cNvSpPr>
+          <p:nvPr>
+            <p:ph idx="1"/>
+          </p:nvPr>
+        </p:nvSpPr>
+        <p:spPr>
+          <a:xfrm>
+            <a:off x="838200" y="2919949"/>
+            <a:ext cx="9616440" cy="2078771"/>
+          </a:xfrm>
+        </p:spPr>
+        <p:txBody>
+          <a:bodyPr>
+            <a:normAutofit/>
+          </a:bodyPr>
+          <a:lstStyle/>
+          <a:p>
+            <a:pPr marL="0" indent="0">
+              <a:buNone/>
+            </a:pPr>
+            <a:r>
+              <a:rPr lang="en-US" sz="2400" dirty="0"/>
+              <a:t>What are on the course website:</a:t>
+            </a:r>
+          </a:p>
+          <a:p>
+            <a:pPr marL="0" indent="0">
+              <a:buNone/>
+            </a:pPr>
+            <a:r>
+              <a:rPr lang="en-US" sz="2400" dirty="0"/>
+              <a:t>	Lecture slides</a:t>
+            </a:r>
+          </a:p>
+          <a:p>
+            <a:pPr marL="0" indent="0">
+              <a:buNone/>
+            </a:pPr>
+            <a:r>
+              <a:rPr lang="en-US" sz="2400" dirty="0"/>
+              <a:t>	Lab material</a:t>
+            </a:r>
+          </a:p>
+          <a:p>
+            <a:pPr marL="0" indent="0">
+              <a:buNone/>
+            </a:pPr>
+            <a:r>
+              <a:rPr lang="en-US" sz="2400" dirty="0"/>
+              <a:t>	Contact Information</a:t>
+            </a:r>
+          </a:p>
+        </p:txBody>
+      </p:sp>
+      <p:sp>
+        <p:nvSpPr>
+          <p:cNvPr id="9" name="Content Placeholder 2">
+            <a:extLst>
+              <a:ext uri="{FF2B5EF4-FFF2-40B4-BE49-F238E27FC236}">
+                <a16:creationId xmlns:a16="http://schemas.microsoft.com/office/drawing/2014/main" id="{8E7D57D7-F9C0-5840-941E-E7D4557F09BF}"/>
+              </a:ext>
+            </a:extLst>
+          </p:cNvPr>
+          <p:cNvSpPr txBox="1">
+            <a:spLocks/>
+          </p:cNvSpPr>
+          <p:nvPr/>
+        </p:nvSpPr>
+        <p:spPr>
+          <a:xfrm>
+            <a:off x="838200" y="5375881"/>
+            <a:ext cx="9616440" cy="852100"/>
+          </a:xfrm>
+          <a:prstGeom prst="rect">
+            <a:avLst/>
+          </a:prstGeom>
+        </p:spPr>
+        <p:txBody>
+          <a:bodyPr vert="horz" lIns="91440" tIns="45720" rIns="91440" bIns="45720" rtlCol="0">
+            <a:normAutofit/>
+          </a:bodyPr>
+          <a:lstStyle>
+            <a:lvl1pPr marL="228600" indent="-228600" algn="l" defTabSz="914400" rtl="0" eaLnBrk="1" latinLnBrk="0" hangingPunct="1">
+              <a:lnSpc>
+                <a:spcPct val="90000"/>
+              </a:lnSpc>
+              <a:spcBef>
+                <a:spcPts val="1000"/>
+              </a:spcBef>
+              <a:buFont typeface="Arial" panose="020B0604020202020204" pitchFamily="34" charset="0"/>
+              <a:buChar char="•"/>
+              <a:defRPr sz="2800" kern="1200">
+                <a:solidFill>
+                  <a:schemeClr val="tx1"/>
+                </a:solidFill>
+                <a:latin typeface="+mn-lt"/>
+                <a:ea typeface="+mn-ea"/>
+                <a:cs typeface="+mn-cs"/>
+              </a:defRPr>
+            </a:lvl1pPr>
+            <a:lvl2pPr marL="685800" indent="-228600" algn="l" defTabSz="914400" rtl="0" eaLnBrk="1" latinLnBrk="0" hangingPunct="1">
+              <a:lnSpc>
+                <a:spcPct val="90000"/>
+              </a:lnSpc>
+              <a:spcBef>
+                <a:spcPts val="500"/>
+              </a:spcBef>
+              <a:buFont typeface="Arial" panose="020B0604020202020204" pitchFamily="34" charset="0"/>
+              <a:buChar char="•"/>
+              <a:defRPr sz="2400" kern="1200">
+                <a:solidFill>
+                  <a:schemeClr val="tx1"/>
+                </a:solidFill>
+                <a:latin typeface="+mn-lt"/>
+                <a:ea typeface="+mn-ea"/>
+                <a:cs typeface="+mn-cs"/>
+              </a:defRPr>
+            </a:lvl2pPr>
+            <a:lvl3pPr marL="1143000" indent="-228600" algn="l" defTabSz="914400" rtl="0" eaLnBrk="1" latinLnBrk="0" hangingPunct="1">
+              <a:lnSpc>
+                <a:spcPct val="90000"/>
+              </a:lnSpc>
+              <a:spcBef>
+                <a:spcPts val="500"/>
+              </a:spcBef>
+              <a:buFont typeface="Arial" panose="020B0604020202020204" pitchFamily="34" charset="0"/>
+              <a:buChar char="•"/>
+              <a:defRPr sz="2000" kern="1200">
+                <a:solidFill>
+                  <a:schemeClr val="tx1"/>
+                </a:solidFill>
+                <a:latin typeface="+mn-lt"/>
+                <a:ea typeface="+mn-ea"/>
+                <a:cs typeface="+mn-cs"/>
+              </a:defRPr>
+            </a:lvl3pPr>
+            <a:lvl4pPr marL="1600200" indent="-228600" algn="l" defTabSz="914400" rtl="0" eaLnBrk="1" latinLnBrk="0" hangingPunct="1">
+              <a:lnSpc>
+                <a:spcPct val="90000"/>
+              </a:lnSpc>
+              <a:spcBef>
+                <a:spcPts val="500"/>
+              </a:spcBef>
+              <a:buFont typeface="Arial" panose="020B0604020202020204" pitchFamily="34" charset="0"/>
+              <a:buChar char="•"/>
+              <a:defRPr sz="1800" kern="1200">
+                <a:solidFill>
+                  <a:schemeClr val="tx1"/>
+                </a:solidFill>
+                <a:latin typeface="+mn-lt"/>
+                <a:ea typeface="+mn-ea"/>
+                <a:cs typeface="+mn-cs"/>
+              </a:defRPr>
+            </a:lvl4pPr>
+            <a:lvl5pPr marL="2057400" indent="-228600" algn="l" defTabSz="914400" rtl="0" eaLnBrk="1" latinLnBrk="0" hangingPunct="1">
+              <a:lnSpc>
+                <a:spcPct val="90000"/>
+              </a:lnSpc>
+              <a:spcBef>
+                <a:spcPts val="500"/>
+              </a:spcBef>
+              <a:buFont typeface="Arial" panose="020B0604020202020204" pitchFamily="34" charset="0"/>
+              <a:buChar char="•"/>
+              <a:defRPr sz="1800" kern="1200">
+                <a:solidFill>
+                  <a:schemeClr val="tx1"/>
+                </a:solidFill>
+                <a:latin typeface="+mn-lt"/>
+                <a:ea typeface="+mn-ea"/>
+                <a:cs typeface="+mn-cs"/>
+              </a:defRPr>
+            </a:lvl5pPr>
+            <a:lvl6pPr marL="2514600" indent="-228600" algn="l" defTabSz="914400" rtl="0" eaLnBrk="1" latinLnBrk="0" hangingPunct="1">
+              <a:lnSpc>
+                <a:spcPct val="90000"/>
+              </a:lnSpc>
+              <a:spcBef>
+                <a:spcPts val="500"/>
+              </a:spcBef>
+              <a:buFont typeface="Arial" panose="020B0604020202020204" pitchFamily="34" charset="0"/>
+              <a:buChar char="•"/>
+              <a:defRPr sz="1800" kern="1200">
+                <a:solidFill>
+                  <a:schemeClr val="tx1"/>
+                </a:solidFill>
+                <a:latin typeface="+mn-lt"/>
+                <a:ea typeface="+mn-ea"/>
+                <a:cs typeface="+mn-cs"/>
+              </a:defRPr>
+            </a:lvl6pPr>
+            <a:lvl7pPr marL="2971800" indent="-228600" algn="l" defTabSz="914400" rtl="0" eaLnBrk="1" latinLnBrk="0" hangingPunct="1">
+              <a:lnSpc>
+                <a:spcPct val="90000"/>
+              </a:lnSpc>
+              <a:spcBef>
+                <a:spcPts val="500"/>
+              </a:spcBef>
+              <a:buFont typeface="Arial" panose="020B0604020202020204" pitchFamily="34" charset="0"/>
+              <a:buChar char="•"/>
+              <a:defRPr sz="1800" kern="1200">
+                <a:solidFill>
+                  <a:schemeClr val="tx1"/>
+                </a:solidFill>
+                <a:latin typeface="+mn-lt"/>
+                <a:ea typeface="+mn-ea"/>
+                <a:cs typeface="+mn-cs"/>
+              </a:defRPr>
+            </a:lvl7pPr>
+            <a:lvl8pPr marL="3429000" indent="-228600" algn="l" defTabSz="914400" rtl="0" eaLnBrk="1" latinLnBrk="0" hangingPunct="1">
+              <a:lnSpc>
+                <a:spcPct val="90000"/>
+              </a:lnSpc>
+              <a:spcBef>
+                <a:spcPts val="500"/>
+              </a:spcBef>
+              <a:buFont typeface="Arial" panose="020B0604020202020204" pitchFamily="34" charset="0"/>
+              <a:buChar char="•"/>
+              <a:defRPr sz="1800" kern="1200">
+                <a:solidFill>
+                  <a:schemeClr val="tx1"/>
+                </a:solidFill>
+                <a:latin typeface="+mn-lt"/>
+                <a:ea typeface="+mn-ea"/>
+                <a:cs typeface="+mn-cs"/>
+              </a:defRPr>
+            </a:lvl8pPr>
+            <a:lvl9pPr marL="3886200" indent="-228600" algn="l" defTabSz="914400" rtl="0" eaLnBrk="1" latinLnBrk="0" hangingPunct="1">
+              <a:lnSpc>
+                <a:spcPct val="90000"/>
+              </a:lnSpc>
+              <a:spcBef>
+                <a:spcPts val="500"/>
+              </a:spcBef>
+              <a:buFont typeface="Arial" panose="020B0604020202020204" pitchFamily="34" charset="0"/>
+              <a:buChar char="•"/>
+              <a:defRPr sz="1800" kern="1200">
+                <a:solidFill>
+                  <a:schemeClr val="tx1"/>
+                </a:solidFill>
+                <a:latin typeface="+mn-lt"/>
+                <a:ea typeface="+mn-ea"/>
+                <a:cs typeface="+mn-cs"/>
+              </a:defRPr>
+            </a:lvl9pPr>
+          </a:lstStyle>
+          <a:p>
+            <a:pPr marL="0" indent="0">
+              <a:buFont typeface="Arial" panose="020B0604020202020204" pitchFamily="34" charset="0"/>
+              <a:buNone/>
+            </a:pPr>
+            <a:r>
+              <a:rPr lang="en-US" sz="2400" dirty="0"/>
+              <a:t>If you are interested in my research, feel free to contact me.</a:t>
+            </a:r>
+          </a:p>
+        </p:txBody>
+      </p:sp>
+    </p:spTree>
+    <p:extLst>
+      <p:ext uri="{BB962C8B-B14F-4D97-AF65-F5344CB8AC3E}">
+        <p14:creationId xmlns:p14="http://schemas.microsoft.com/office/powerpoint/2010/main" val="1524471069"/>
+      </p:ext>
+    </p:extLst>
+  </p:cSld>
+  <p:clrMapOvr>
+    <a:masterClrMapping/>
+  </p:clrMapOvr>
+</p:sld>
+</file>
+
+<file path=ppt/slides/slide20.xml><?xml version="1.0" encoding="utf-8"?>
 <p:sld xmlns:a="http://schemas.openxmlformats.org/drawingml/2006/main" xmlns:r="http://schemas.openxmlformats.org/officeDocument/2006/relationships" xmlns:p="http://schemas.openxmlformats.org/presentationml/2006/main">
   <p:cSld>
     <p:spTree>
@@ -6228,7 +8348,7 @@
 </p:sld>
 </file>
 
-<file path=ppt/slides/slide2.xml><?xml version="1.0" encoding="utf-8"?>
+<file path=ppt/slides/slide21.xml><?xml version="1.0" encoding="utf-8"?>
 <p:sld xmlns:a="http://schemas.openxmlformats.org/drawingml/2006/main" xmlns:r="http://schemas.openxmlformats.org/officeDocument/2006/relationships" xmlns:p="http://schemas.openxmlformats.org/presentationml/2006/main">
   <p:cSld>
     <p:spTree>
@@ -6587,7 +8707,7 @@
     </p:spTree>
     <p:extLst>
       <p:ext uri="{BB962C8B-B14F-4D97-AF65-F5344CB8AC3E}">
-        <p14:creationId xmlns:p14="http://schemas.microsoft.com/office/powerpoint/2010/main" val="1524471069"/>
+        <p14:creationId xmlns:p14="http://schemas.microsoft.com/office/powerpoint/2010/main" val="1613744569"/>
       </p:ext>
     </p:extLst>
   </p:cSld>
@@ -7294,6 +9414,105 @@
           <a:p>
             <a:r>
               <a:rPr lang="en-US" dirty="0"/>
+              <a:t>Generating New Samples (Generative Models)</a:t>
+            </a:r>
+          </a:p>
+        </p:txBody>
+      </p:sp>
+      <p:pic>
+        <p:nvPicPr>
+          <p:cNvPr id="9218" name="Picture 2" descr="Generative Adversarial Networks: Build Your First Models – Real Python">
+            <a:extLst>
+              <a:ext uri="{FF2B5EF4-FFF2-40B4-BE49-F238E27FC236}">
+                <a16:creationId xmlns:a16="http://schemas.microsoft.com/office/drawing/2014/main" id="{4CE9CD9E-71CE-1842-BE49-707FEC29413C}"/>
+              </a:ext>
+            </a:extLst>
+          </p:cNvPr>
+          <p:cNvPicPr>
+            <a:picLocks noChangeAspect="1" noChangeArrowheads="1"/>
+          </p:cNvPicPr>
+          <p:nvPr/>
+        </p:nvPicPr>
+        <p:blipFill>
+          <a:blip r:embed="rId2">
+            <a:extLst>
+              <a:ext uri="{28A0092B-C50C-407E-A947-70E740481C1C}">
+                <a14:useLocalDpi xmlns:a14="http://schemas.microsoft.com/office/drawing/2010/main" val="0"/>
+              </a:ext>
+            </a:extLst>
+          </a:blip>
+          <a:srcRect/>
+          <a:stretch>
+            <a:fillRect/>
+          </a:stretch>
+        </p:blipFill>
+        <p:spPr bwMode="auto">
+          <a:xfrm>
+            <a:off x="838200" y="2283779"/>
+            <a:ext cx="9722815" cy="3309302"/>
+          </a:xfrm>
+          <a:prstGeom prst="rect">
+            <a:avLst/>
+          </a:prstGeom>
+          <a:noFill/>
+          <a:extLst>
+            <a:ext uri="{909E8E84-426E-40DD-AFC4-6F175D3DCCD1}">
+              <a14:hiddenFill xmlns:a14="http://schemas.microsoft.com/office/drawing/2010/main">
+                <a:solidFill>
+                  <a:srgbClr val="FFFFFF"/>
+                </a:solidFill>
+              </a14:hiddenFill>
+            </a:ext>
+          </a:extLst>
+        </p:spPr>
+      </p:pic>
+    </p:spTree>
+    <p:extLst>
+      <p:ext uri="{BB962C8B-B14F-4D97-AF65-F5344CB8AC3E}">
+        <p14:creationId xmlns:p14="http://schemas.microsoft.com/office/powerpoint/2010/main" val="287532432"/>
+      </p:ext>
+    </p:extLst>
+  </p:cSld>
+  <p:clrMapOvr>
+    <a:masterClrMapping/>
+  </p:clrMapOvr>
+</p:sld>
+</file>
+
+<file path=ppt/slides/slide8.xml><?xml version="1.0" encoding="utf-8"?>
+<p:sld xmlns:a="http://schemas.openxmlformats.org/drawingml/2006/main" xmlns:r="http://schemas.openxmlformats.org/officeDocument/2006/relationships" xmlns:p="http://schemas.openxmlformats.org/presentationml/2006/main">
+  <p:cSld>
+    <p:spTree>
+      <p:nvGrpSpPr>
+        <p:cNvPr id="1" name=""/>
+        <p:cNvGrpSpPr/>
+        <p:nvPr/>
+      </p:nvGrpSpPr>
+      <p:grpSpPr>
+        <a:xfrm>
+          <a:off x="0" y="0"/>
+          <a:ext cx="0" cy="0"/>
+          <a:chOff x="0" y="0"/>
+          <a:chExt cx="0" cy="0"/>
+        </a:xfrm>
+      </p:grpSpPr>
+      <p:sp>
+        <p:nvSpPr>
+          <p:cNvPr id="2" name="Title 1"/>
+          <p:cNvSpPr>
+            <a:spLocks noGrp="1"/>
+          </p:cNvSpPr>
+          <p:nvPr>
+            <p:ph type="title"/>
+          </p:nvPr>
+        </p:nvSpPr>
+        <p:spPr/>
+        <p:txBody>
+          <a:bodyPr/>
+          <a:lstStyle/>
+          <a:p>
+            <a:r>
+              <a:rPr lang="en-US" dirty="0"/>
               <a:t>Text-to-Image Generation</a:t>
             </a:r>
           </a:p>
@@ -7359,218 +9578,6 @@
 </p:sld>
 </file>
 
-<file path=ppt/slides/slide8.xml><?xml version="1.0" encoding="utf-8"?>
-<p:sld xmlns:a="http://schemas.openxmlformats.org/drawingml/2006/main" xmlns:r="http://schemas.openxmlformats.org/officeDocument/2006/relationships" xmlns:p="http://schemas.openxmlformats.org/presentationml/2006/main">
-  <p:cSld>
-    <p:spTree>
-      <p:nvGrpSpPr>
-        <p:cNvPr id="1" name=""/>
-        <p:cNvGrpSpPr/>
-        <p:nvPr/>
-      </p:nvGrpSpPr>
-      <p:grpSpPr>
-        <a:xfrm>
-          <a:off x="0" y="0"/>
-          <a:ext cx="0" cy="0"/>
-          <a:chOff x="0" y="0"/>
-          <a:chExt cx="0" cy="0"/>
-        </a:xfrm>
-      </p:grpSpPr>
-      <p:sp>
-        <p:nvSpPr>
-          <p:cNvPr id="2" name="Title 1"/>
-          <p:cNvSpPr>
-            <a:spLocks noGrp="1"/>
-          </p:cNvSpPr>
-          <p:nvPr>
-            <p:ph type="title"/>
-          </p:nvPr>
-        </p:nvSpPr>
-        <p:spPr/>
-        <p:txBody>
-          <a:bodyPr/>
-          <a:lstStyle/>
-          <a:p>
-            <a:r>
-              <a:rPr lang="en-US" dirty="0"/>
-              <a:t>Applications of Statistical Learning</a:t>
-            </a:r>
-          </a:p>
-        </p:txBody>
-      </p:sp>
-      <p:sp>
-        <p:nvSpPr>
-          <p:cNvPr id="3" name="Content Placeholder 2"/>
-          <p:cNvSpPr>
-            <a:spLocks noGrp="1"/>
-          </p:cNvSpPr>
-          <p:nvPr>
-            <p:ph idx="1"/>
-          </p:nvPr>
-        </p:nvSpPr>
-        <p:spPr>
-          <a:xfrm>
-            <a:off x="838200" y="1690688"/>
-            <a:ext cx="10341077" cy="3906582"/>
-          </a:xfrm>
-        </p:spPr>
-        <p:txBody>
-          <a:bodyPr>
-            <a:noAutofit/>
-          </a:bodyPr>
-          <a:lstStyle/>
-          <a:p>
-            <a:pPr marL="12700" marR="5080">
-              <a:lnSpc>
-                <a:spcPct val="150000"/>
-              </a:lnSpc>
-              <a:spcBef>
-                <a:spcPts val="95"/>
-              </a:spcBef>
-            </a:pPr>
-            <a:r>
-              <a:rPr lang="en-US" sz="2400" spc="-5" dirty="0">
-                <a:latin typeface="Microsoft Sans Serif"/>
-                <a:cs typeface="Microsoft Sans Serif"/>
-              </a:rPr>
-              <a:t>bioinformatics</a:t>
-            </a:r>
-          </a:p>
-          <a:p>
-            <a:pPr marL="12700" marR="5080">
-              <a:lnSpc>
-                <a:spcPct val="150000"/>
-              </a:lnSpc>
-              <a:spcBef>
-                <a:spcPts val="95"/>
-              </a:spcBef>
-            </a:pPr>
-            <a:r>
-              <a:rPr lang="en-US" sz="2400" spc="-5" dirty="0">
-                <a:latin typeface="Microsoft Sans Serif"/>
-                <a:cs typeface="Microsoft Sans Serif"/>
-              </a:rPr>
-              <a:t>detecting network intrusion</a:t>
-            </a:r>
-          </a:p>
-          <a:p>
-            <a:pPr marL="12700" marR="5080">
-              <a:lnSpc>
-                <a:spcPct val="150000"/>
-              </a:lnSpc>
-              <a:spcBef>
-                <a:spcPts val="95"/>
-              </a:spcBef>
-            </a:pPr>
-            <a:r>
-              <a:rPr lang="en-US" sz="2400" spc="-5" dirty="0">
-                <a:latin typeface="Microsoft Sans Serif"/>
-                <a:cs typeface="Microsoft Sans Serif"/>
-              </a:rPr>
-              <a:t>neuroscience</a:t>
-            </a:r>
-          </a:p>
-          <a:p>
-            <a:pPr marL="12700" marR="5080">
-              <a:lnSpc>
-                <a:spcPct val="150000"/>
-              </a:lnSpc>
-              <a:spcBef>
-                <a:spcPts val="95"/>
-              </a:spcBef>
-            </a:pPr>
-            <a:r>
-              <a:rPr lang="en-US" sz="2400" spc="-5" dirty="0">
-                <a:latin typeface="Microsoft Sans Serif"/>
-                <a:cs typeface="Microsoft Sans Serif"/>
-              </a:rPr>
-              <a:t>medical diagnosis</a:t>
-            </a:r>
-          </a:p>
-          <a:p>
-            <a:pPr marL="12700" marR="5080">
-              <a:lnSpc>
-                <a:spcPct val="150000"/>
-              </a:lnSpc>
-              <a:spcBef>
-                <a:spcPts val="95"/>
-              </a:spcBef>
-            </a:pPr>
-            <a:r>
-              <a:rPr lang="en-US" sz="2400" spc="-5" dirty="0">
-                <a:latin typeface="Microsoft Sans Serif"/>
-                <a:cs typeface="Microsoft Sans Serif"/>
-              </a:rPr>
-              <a:t>stock market analysis</a:t>
-            </a:r>
-          </a:p>
-          <a:p>
-            <a:pPr marL="12700" marR="5080">
-              <a:lnSpc>
-                <a:spcPct val="150000"/>
-              </a:lnSpc>
-              <a:spcBef>
-                <a:spcPts val="95"/>
-              </a:spcBef>
-            </a:pPr>
-            <a:r>
-              <a:rPr lang="en-US" sz="2400" spc="-5" dirty="0">
-                <a:latin typeface="Microsoft Sans Serif"/>
-                <a:cs typeface="Microsoft Sans Serif"/>
-              </a:rPr>
-              <a:t>social network analysis</a:t>
-            </a:r>
-          </a:p>
-          <a:p>
-            <a:pPr marL="12700" marR="5080">
-              <a:lnSpc>
-                <a:spcPct val="150000"/>
-              </a:lnSpc>
-              <a:spcBef>
-                <a:spcPts val="95"/>
-              </a:spcBef>
-            </a:pPr>
-            <a:r>
-              <a:rPr lang="en-US" sz="2400" spc="-5" dirty="0">
-                <a:latin typeface="Microsoft Sans Serif"/>
-                <a:cs typeface="Microsoft Sans Serif"/>
-              </a:rPr>
-              <a:t>traffic and infrastructure planning</a:t>
-            </a:r>
-          </a:p>
-          <a:p>
-            <a:pPr marL="0" marR="5080" indent="0">
-              <a:lnSpc>
-                <a:spcPct val="150000"/>
-              </a:lnSpc>
-              <a:spcBef>
-                <a:spcPts val="95"/>
-              </a:spcBef>
-              <a:buNone/>
-            </a:pPr>
-            <a:r>
-              <a:rPr lang="en-GB" sz="2400" spc="-5" dirty="0">
-                <a:latin typeface="Microsoft Sans Serif"/>
-                <a:cs typeface="Microsoft Sans Serif"/>
-              </a:rPr>
-              <a:t>…</a:t>
-            </a:r>
-          </a:p>
-        </p:txBody>
-      </p:sp>
-    </p:spTree>
-    <p:extLst>
-      <p:ext uri="{BB962C8B-B14F-4D97-AF65-F5344CB8AC3E}">
-        <p14:creationId xmlns:p14="http://schemas.microsoft.com/office/powerpoint/2010/main" val="1423582021"/>
-      </p:ext>
-    </p:extLst>
-  </p:cSld>
-  <p:clrMapOvr>
-    <a:masterClrMapping/>
-  </p:clrMapOvr>
-</p:sld>
-</file>
-
 <file path=ppt/slides/slide9.xml><?xml version="1.0" encoding="utf-8"?>
 <p:sld xmlns:a="http://schemas.openxmlformats.org/drawingml/2006/main" xmlns:r="http://schemas.openxmlformats.org/officeDocument/2006/relationships" xmlns:p="http://schemas.openxmlformats.org/presentationml/2006/main">
   <p:cSld>
@@ -7605,20 +9612,14 @@
           <a:p>
             <a:r>
               <a:rPr lang="en-US" dirty="0"/>
-              <a:t>Textbooks</a:t>
-            </a:r>
-          </a:p>
-        </p:txBody>
-      </p:sp>
-      <p:sp>
-        <p:nvSpPr>
-          <p:cNvPr id="7" name="Content Placeholder 3">
-            <a:extLst>
-              <a:ext uri="{FF2B5EF4-FFF2-40B4-BE49-F238E27FC236}">
-                <a16:creationId xmlns:a16="http://schemas.microsoft.com/office/drawing/2014/main" id="{C4C2037F-909E-E840-8A09-C2EF77C2CBAC}"/>
-              </a:ext>
-            </a:extLst>
-          </p:cNvPr>
+              <a:t>Applications of Statistical Learning</a:t>
+            </a:r>
+          </a:p>
+        </p:txBody>
+      </p:sp>
+      <p:sp>
+        <p:nvSpPr>
+          <p:cNvPr id="3" name="Content Placeholder 2"/>
           <p:cNvSpPr>
             <a:spLocks noGrp="1"/>
           </p:cNvSpPr>
@@ -7628,71 +9629,150 @@
         </p:nvSpPr>
         <p:spPr>
           <a:xfrm>
-            <a:off x="838200" y="1918652"/>
-            <a:ext cx="10515600" cy="3020695"/>
+            <a:off x="838200" y="1690688"/>
+            <a:ext cx="10341077" cy="3906582"/>
           </a:xfrm>
         </p:spPr>
         <p:txBody>
           <a:bodyPr>
-            <a:normAutofit/>
+            <a:noAutofit/>
           </a:bodyPr>
           <a:lstStyle/>
           <a:p>
-            <a:r>
-              <a:rPr lang="en-US" dirty="0"/>
-              <a:t>An Introduction to Statistical Learning</a:t>
-            </a:r>
-          </a:p>
-          <a:p>
-            <a:endParaRPr lang="en-US" dirty="0"/>
-          </a:p>
-          <a:p>
-            <a:r>
-              <a:rPr lang="en-US" dirty="0"/>
-              <a:t>Machine Learning with Python Tutorial (Optional)</a:t>
-            </a:r>
-          </a:p>
-        </p:txBody>
-      </p:sp>
-      <p:sp>
-        <p:nvSpPr>
-          <p:cNvPr id="8" name="TextBox 7">
-            <a:extLst>
-              <a:ext uri="{FF2B5EF4-FFF2-40B4-BE49-F238E27FC236}">
-                <a16:creationId xmlns:a16="http://schemas.microsoft.com/office/drawing/2014/main" id="{C7F910D6-5D5C-424B-BE21-E59B9B3E45A4}"/>
-              </a:ext>
-            </a:extLst>
-          </p:cNvPr>
-          <p:cNvSpPr txBox="1"/>
-          <p:nvPr/>
-        </p:nvSpPr>
-        <p:spPr>
-          <a:xfrm>
-            <a:off x="838200" y="4188122"/>
-            <a:ext cx="9159240" cy="461665"/>
-          </a:xfrm>
-          <a:prstGeom prst="rect">
-            <a:avLst/>
-          </a:prstGeom>
-          <a:noFill/>
-        </p:spPr>
-        <p:txBody>
-          <a:bodyPr wrap="square">
-            <a:spAutoFit/>
-          </a:bodyPr>
-          <a:lstStyle/>
-          <a:p>
-            <a:r>
-              <a:rPr lang="en-US" sz="2400" dirty="0"/>
-              <a:t>https://tianzheng4.github.io/</a:t>
-            </a:r>
-            <a:r>
-              <a:rPr lang="en-US" sz="2400" dirty="0" err="1"/>
-              <a:t>umkc</a:t>
-            </a:r>
-            <a:r>
-              <a:rPr lang="en-US" sz="2400" dirty="0"/>
-              <a:t>-teaching/2023-fall-teaching-1/</a:t>
+            <a:pPr marL="12700" marR="5080">
+              <a:lnSpc>
+                <a:spcPct val="150000"/>
+              </a:lnSpc>
+              <a:spcBef>
+                <a:spcPts val="95"/>
+              </a:spcBef>
+            </a:pPr>
+            <a:r>
+              <a:rPr lang="en-US" sz="2400" spc="-5" dirty="0">
+                <a:latin typeface="Microsoft Sans Serif"/>
+                <a:cs typeface="Microsoft Sans Serif"/>
+              </a:rPr>
+              <a:t>bioinformatics</a:t>
+            </a:r>
+          </a:p>
+          <a:p>
+            <a:pPr marL="12700" marR="5080">
+              <a:lnSpc>
+                <a:spcPct val="150000"/>
+              </a:lnSpc>
+              <a:spcBef>
+                <a:spcPts val="95"/>
+              </a:spcBef>
+            </a:pPr>
+            <a:r>
+              <a:rPr lang="en-US" sz="2400" spc="-5" dirty="0">
+                <a:latin typeface="Microsoft Sans Serif"/>
+                <a:cs typeface="Microsoft Sans Serif"/>
+              </a:rPr>
+              <a:t>detecting network intrusion</a:t>
+            </a:r>
+          </a:p>
+          <a:p>
+            <a:pPr marL="12700" marR="5080">
+              <a:lnSpc>
+                <a:spcPct val="150000"/>
+              </a:lnSpc>
+              <a:spcBef>
+                <a:spcPts val="95"/>
+              </a:spcBef>
+            </a:pPr>
+            <a:r>
+              <a:rPr lang="en-US" sz="2400" spc="-5" dirty="0">
+                <a:latin typeface="Microsoft Sans Serif"/>
+                <a:cs typeface="Microsoft Sans Serif"/>
+              </a:rPr>
+              <a:t>neuroscience</a:t>
+            </a:r>
+          </a:p>
+          <a:p>
+            <a:pPr marL="12700" marR="5080">
+              <a:lnSpc>
+                <a:spcPct val="150000"/>
+              </a:lnSpc>
+              <a:spcBef>
+                <a:spcPts val="95"/>
+              </a:spcBef>
+            </a:pPr>
+            <a:r>
+              <a:rPr lang="en-US" sz="2400" spc="-5" dirty="0">
+                <a:latin typeface="Microsoft Sans Serif"/>
+                <a:cs typeface="Microsoft Sans Serif"/>
+              </a:rPr>
+              <a:t>medical diagnosis</a:t>
+            </a:r>
+          </a:p>
+          <a:p>
+            <a:pPr marL="12700" marR="5080">
+              <a:lnSpc>
+                <a:spcPct val="150000"/>
+              </a:lnSpc>
+              <a:spcBef>
+                <a:spcPts val="95"/>
+              </a:spcBef>
+            </a:pPr>
+            <a:r>
+              <a:rPr lang="en-US" sz="2400" spc="-5" dirty="0">
+                <a:latin typeface="Microsoft Sans Serif"/>
+                <a:cs typeface="Microsoft Sans Serif"/>
+              </a:rPr>
+              <a:t>stock market analysis</a:t>
+            </a:r>
+          </a:p>
+          <a:p>
+            <a:pPr marL="12700" marR="5080">
+              <a:lnSpc>
+                <a:spcPct val="150000"/>
+              </a:lnSpc>
+              <a:spcBef>
+                <a:spcPts val="95"/>
+              </a:spcBef>
+            </a:pPr>
+            <a:r>
+              <a:rPr lang="en-US" sz="2400" spc="-5" dirty="0">
+                <a:latin typeface="Microsoft Sans Serif"/>
+                <a:cs typeface="Microsoft Sans Serif"/>
+              </a:rPr>
+              <a:t>social network analysis</a:t>
+            </a:r>
+          </a:p>
+          <a:p>
+            <a:pPr marL="12700" marR="5080">
+              <a:lnSpc>
+                <a:spcPct val="150000"/>
+              </a:lnSpc>
+              <a:spcBef>
+                <a:spcPts val="95"/>
+              </a:spcBef>
+            </a:pPr>
+            <a:r>
+              <a:rPr lang="en-US" sz="2400" spc="-5" dirty="0">
+                <a:latin typeface="Microsoft Sans Serif"/>
+                <a:cs typeface="Microsoft Sans Serif"/>
+              </a:rPr>
+              <a:t>traffic and infrastructure planning</a:t>
+            </a:r>
+          </a:p>
+          <a:p>
+            <a:pPr marL="0" marR="5080" indent="0">
+              <a:lnSpc>
+                <a:spcPct val="150000"/>
+              </a:lnSpc>
+              <a:spcBef>
+                <a:spcPts val="95"/>
+              </a:spcBef>
+              <a:buNone/>
+            </a:pPr>
+            <a:r>
+              <a:rPr lang="en-GB" sz="2400" spc="-5" dirty="0">
+                <a:latin typeface="Microsoft Sans Serif"/>
+                <a:cs typeface="Microsoft Sans Serif"/>
+              </a:rPr>
+              <a:t>…</a:t>
             </a:r>
           </a:p>
         </p:txBody>
@@ -7700,7 +9780,7 @@
     </p:spTree>
     <p:extLst>
       <p:ext uri="{BB962C8B-B14F-4D97-AF65-F5344CB8AC3E}">
-        <p14:creationId xmlns:p14="http://schemas.microsoft.com/office/powerpoint/2010/main" val="1327267736"/>
+        <p14:creationId xmlns:p14="http://schemas.microsoft.com/office/powerpoint/2010/main" val="1423582021"/>
       </p:ext>
     </p:extLst>
   </p:cSld>

</xml_diff>